<commit_message>
Added a Presentation Folder
</commit_message>
<xml_diff>
--- a/Presentation/Orange-Fleshed Sweet Potatoes.pptx
+++ b/Presentation/Orange-Fleshed Sweet Potatoes.pptx
@@ -8,14 +8,17 @@
     <p:sldId id="256" r:id="rId2"/>
     <p:sldId id="257" r:id="rId3"/>
     <p:sldId id="258" r:id="rId4"/>
-    <p:sldId id="265" r:id="rId5"/>
-    <p:sldId id="259" r:id="rId6"/>
-    <p:sldId id="264" r:id="rId7"/>
-    <p:sldId id="266" r:id="rId8"/>
-    <p:sldId id="260" r:id="rId9"/>
-    <p:sldId id="261" r:id="rId10"/>
-    <p:sldId id="262" r:id="rId11"/>
-    <p:sldId id="263" r:id="rId12"/>
+    <p:sldId id="268" r:id="rId5"/>
+    <p:sldId id="269" r:id="rId6"/>
+    <p:sldId id="267" r:id="rId7"/>
+    <p:sldId id="265" r:id="rId8"/>
+    <p:sldId id="259" r:id="rId9"/>
+    <p:sldId id="264" r:id="rId10"/>
+    <p:sldId id="266" r:id="rId11"/>
+    <p:sldId id="260" r:id="rId12"/>
+    <p:sldId id="261" r:id="rId13"/>
+    <p:sldId id="262" r:id="rId14"/>
+    <p:sldId id="263" r:id="rId15"/>
   </p:sldIdLst>
   <p:sldSz cx="9144000" cy="6858000" type="screen4x3"/>
   <p:notesSz cx="6858000" cy="9144000"/>
@@ -126,6 +129,9 @@
         <p14:section name="Untitled Section" id="{18248954-FF9D-4224-A243-91FA19F1C97E}">
           <p14:sldIdLst>
             <p14:sldId id="258"/>
+            <p14:sldId id="268"/>
+            <p14:sldId id="269"/>
+            <p14:sldId id="267"/>
             <p14:sldId id="265"/>
             <p14:sldId id="259"/>
             <p14:sldId id="264"/>
@@ -137,6 +143,20 @@
           </p14:sldIdLst>
         </p14:section>
       </p14:sectionLst>
+    </p:ext>
+    <p:ext uri="{EFAFB233-063F-42B5-8137-9DF3F51BA10A}">
+      <p15:sldGuideLst xmlns:p15="http://schemas.microsoft.com/office/powerpoint/2012/main">
+        <p15:guide id="1" orient="horz" pos="2160">
+          <p15:clr>
+            <a:srgbClr val="A4A3A4"/>
+          </p15:clr>
+        </p15:guide>
+        <p15:guide id="2" pos="2880">
+          <p15:clr>
+            <a:srgbClr val="A4A3A4"/>
+          </p15:clr>
+        </p15:guide>
+      </p15:sldGuideLst>
     </p:ext>
   </p:extLst>
 </p:presentation>
@@ -189,10 +209,9 @@
           </a:lstStyle>
           <a:p>
             <a:r>
-              <a:rPr kumimoji="0" lang="en-US" smtClean="0"/>
+              <a:rPr kumimoji="0" lang="en-US"/>
               <a:t>Click to edit Master title style</a:t>
             </a:r>
-            <a:endParaRPr kumimoji="0" lang="en-US"/>
           </a:p>
         </p:txBody>
       </p:sp>
@@ -250,10 +269,9 @@
           </a:lstStyle>
           <a:p>
             <a:r>
-              <a:rPr kumimoji="0" lang="en-US" smtClean="0"/>
+              <a:rPr kumimoji="0" lang="en-US"/>
               <a:t>Click to edit Master subtitle style</a:t>
             </a:r>
-            <a:endParaRPr kumimoji="0" lang="en-US"/>
           </a:p>
         </p:txBody>
       </p:sp>
@@ -280,7 +298,7 @@
             <a:fld id="{1D8BD707-D9CF-40AE-B4C6-C98DA3205C09}" type="datetimeFigureOut">
               <a:rPr lang="en-US" smtClean="0"/>
               <a:pPr/>
-              <a:t>8/14/2022</a:t>
+              <a:t>8/15/2022</a:t>
             </a:fld>
             <a:endParaRPr lang="en-US"/>
           </a:p>
@@ -1074,10 +1092,9 @@
           <a:lstStyle/>
           <a:p>
             <a:r>
-              <a:rPr kumimoji="0" lang="en-US" smtClean="0"/>
+              <a:rPr kumimoji="0" lang="en-US"/>
               <a:t>Click to edit Master title style</a:t>
             </a:r>
-            <a:endParaRPr kumimoji="0" lang="en-US"/>
           </a:p>
         </p:txBody>
       </p:sp>
@@ -1098,35 +1115,35 @@
           <a:p>
             <a:pPr lvl="0" eaLnBrk="1" latinLnBrk="0" hangingPunct="1"/>
             <a:r>
-              <a:rPr lang="en-US" smtClean="0"/>
+              <a:rPr lang="en-US"/>
               <a:t>Click to edit Master text styles</a:t>
             </a:r>
           </a:p>
           <a:p>
             <a:pPr lvl="1" eaLnBrk="1" latinLnBrk="0" hangingPunct="1"/>
             <a:r>
-              <a:rPr lang="en-US" smtClean="0"/>
+              <a:rPr lang="en-US"/>
               <a:t>Second level</a:t>
             </a:r>
           </a:p>
           <a:p>
             <a:pPr lvl="2" eaLnBrk="1" latinLnBrk="0" hangingPunct="1"/>
             <a:r>
-              <a:rPr lang="en-US" smtClean="0"/>
+              <a:rPr lang="en-US"/>
               <a:t>Third level</a:t>
             </a:r>
           </a:p>
           <a:p>
             <a:pPr lvl="3" eaLnBrk="1" latinLnBrk="0" hangingPunct="1"/>
             <a:r>
-              <a:rPr lang="en-US" smtClean="0"/>
+              <a:rPr lang="en-US"/>
               <a:t>Fourth level</a:t>
             </a:r>
           </a:p>
           <a:p>
             <a:pPr lvl="4" eaLnBrk="1" latinLnBrk="0" hangingPunct="1"/>
             <a:r>
-              <a:rPr lang="en-US" smtClean="0"/>
+              <a:rPr lang="en-US"/>
               <a:t>Fifth level</a:t>
             </a:r>
             <a:endParaRPr kumimoji="0" lang="en-US"/>
@@ -1151,7 +1168,7 @@
             <a:fld id="{1D8BD707-D9CF-40AE-B4C6-C98DA3205C09}" type="datetimeFigureOut">
               <a:rPr lang="en-US" smtClean="0"/>
               <a:pPr/>
-              <a:t>8/14/2022</a:t>
+              <a:t>8/15/2022</a:t>
             </a:fld>
             <a:endParaRPr lang="en-US"/>
           </a:p>
@@ -1246,10 +1263,9 @@
           <a:lstStyle/>
           <a:p>
             <a:r>
-              <a:rPr kumimoji="0" lang="en-US" smtClean="0"/>
+              <a:rPr kumimoji="0" lang="en-US"/>
               <a:t>Click to edit Master title style</a:t>
             </a:r>
-            <a:endParaRPr kumimoji="0" lang="en-US"/>
           </a:p>
         </p:txBody>
       </p:sp>
@@ -1275,35 +1291,35 @@
           <a:p>
             <a:pPr lvl="0" eaLnBrk="1" latinLnBrk="0" hangingPunct="1"/>
             <a:r>
-              <a:rPr lang="en-US" smtClean="0"/>
+              <a:rPr lang="en-US"/>
               <a:t>Click to edit Master text styles</a:t>
             </a:r>
           </a:p>
           <a:p>
             <a:pPr lvl="1" eaLnBrk="1" latinLnBrk="0" hangingPunct="1"/>
             <a:r>
-              <a:rPr lang="en-US" smtClean="0"/>
+              <a:rPr lang="en-US"/>
               <a:t>Second level</a:t>
             </a:r>
           </a:p>
           <a:p>
             <a:pPr lvl="2" eaLnBrk="1" latinLnBrk="0" hangingPunct="1"/>
             <a:r>
-              <a:rPr lang="en-US" smtClean="0"/>
+              <a:rPr lang="en-US"/>
               <a:t>Third level</a:t>
             </a:r>
           </a:p>
           <a:p>
             <a:pPr lvl="3" eaLnBrk="1" latinLnBrk="0" hangingPunct="1"/>
             <a:r>
-              <a:rPr lang="en-US" smtClean="0"/>
+              <a:rPr lang="en-US"/>
               <a:t>Fourth level</a:t>
             </a:r>
           </a:p>
           <a:p>
             <a:pPr lvl="4" eaLnBrk="1" latinLnBrk="0" hangingPunct="1"/>
             <a:r>
-              <a:rPr lang="en-US" smtClean="0"/>
+              <a:rPr lang="en-US"/>
               <a:t>Fifth level</a:t>
             </a:r>
             <a:endParaRPr kumimoji="0" lang="en-US"/>
@@ -1328,7 +1344,7 @@
             <a:fld id="{1D8BD707-D9CF-40AE-B4C6-C98DA3205C09}" type="datetimeFigureOut">
               <a:rPr lang="en-US" smtClean="0"/>
               <a:pPr/>
-              <a:t>8/14/2022</a:t>
+              <a:t>8/15/2022</a:t>
             </a:fld>
             <a:endParaRPr lang="en-US"/>
           </a:p>
@@ -1418,10 +1434,9 @@
           <a:lstStyle/>
           <a:p>
             <a:r>
-              <a:rPr kumimoji="0" lang="en-US" smtClean="0"/>
+              <a:rPr kumimoji="0" lang="en-US"/>
               <a:t>Click to edit Master title style</a:t>
             </a:r>
-            <a:endParaRPr kumimoji="0" lang="en-US"/>
           </a:p>
         </p:txBody>
       </p:sp>
@@ -1447,35 +1462,35 @@
           <a:p>
             <a:pPr lvl="0" eaLnBrk="1" latinLnBrk="0" hangingPunct="1"/>
             <a:r>
-              <a:rPr lang="en-US" smtClean="0"/>
+              <a:rPr lang="en-US"/>
               <a:t>Click to edit Master text styles</a:t>
             </a:r>
           </a:p>
           <a:p>
             <a:pPr lvl="1" eaLnBrk="1" latinLnBrk="0" hangingPunct="1"/>
             <a:r>
-              <a:rPr lang="en-US" smtClean="0"/>
+              <a:rPr lang="en-US"/>
               <a:t>Second level</a:t>
             </a:r>
           </a:p>
           <a:p>
             <a:pPr lvl="2" eaLnBrk="1" latinLnBrk="0" hangingPunct="1"/>
             <a:r>
-              <a:rPr lang="en-US" smtClean="0"/>
+              <a:rPr lang="en-US"/>
               <a:t>Third level</a:t>
             </a:r>
           </a:p>
           <a:p>
             <a:pPr lvl="3" eaLnBrk="1" latinLnBrk="0" hangingPunct="1"/>
             <a:r>
-              <a:rPr lang="en-US" smtClean="0"/>
+              <a:rPr lang="en-US"/>
               <a:t>Fourth level</a:t>
             </a:r>
           </a:p>
           <a:p>
             <a:pPr lvl="4" eaLnBrk="1" latinLnBrk="0" hangingPunct="1"/>
             <a:r>
-              <a:rPr lang="en-US" smtClean="0"/>
+              <a:rPr lang="en-US"/>
               <a:t>Fifth level</a:t>
             </a:r>
             <a:endParaRPr kumimoji="0" lang="en-US"/>
@@ -1500,7 +1515,7 @@
             <a:fld id="{1D8BD707-D9CF-40AE-B4C6-C98DA3205C09}" type="datetimeFigureOut">
               <a:rPr lang="en-US" smtClean="0"/>
               <a:pPr/>
-              <a:t>8/14/2022</a:t>
+              <a:t>8/15/2022</a:t>
             </a:fld>
             <a:endParaRPr lang="en-US"/>
           </a:p>
@@ -1605,10 +1620,9 @@
           </a:lstStyle>
           <a:p>
             <a:r>
-              <a:rPr kumimoji="0" lang="en-US" smtClean="0"/>
+              <a:rPr kumimoji="0" lang="en-US"/>
               <a:t>Click to edit Master title style</a:t>
             </a:r>
-            <a:endParaRPr kumimoji="0" lang="en-US"/>
           </a:p>
         </p:txBody>
       </p:sp>
@@ -1683,7 +1697,7 @@
           <a:p>
             <a:pPr lvl="0" eaLnBrk="1" latinLnBrk="0" hangingPunct="1"/>
             <a:r>
-              <a:rPr kumimoji="0" lang="en-US" smtClean="0"/>
+              <a:rPr kumimoji="0" lang="en-US"/>
               <a:t>Click to edit Master text styles</a:t>
             </a:r>
           </a:p>
@@ -1712,7 +1726,7 @@
             <a:fld id="{1D8BD707-D9CF-40AE-B4C6-C98DA3205C09}" type="datetimeFigureOut">
               <a:rPr lang="en-US" smtClean="0"/>
               <a:pPr/>
-              <a:t>8/14/2022</a:t>
+              <a:t>8/15/2022</a:t>
             </a:fld>
             <a:endParaRPr lang="en-US"/>
           </a:p>
@@ -2503,10 +2517,9 @@
           <a:lstStyle/>
           <a:p>
             <a:r>
-              <a:rPr kumimoji="0" lang="en-US" smtClean="0"/>
+              <a:rPr kumimoji="0" lang="en-US"/>
               <a:t>Click to edit Master title style</a:t>
             </a:r>
-            <a:endParaRPr kumimoji="0" lang="en-US"/>
           </a:p>
         </p:txBody>
       </p:sp>
@@ -2528,7 +2541,7 @@
             <a:fld id="{1D8BD707-D9CF-40AE-B4C6-C98DA3205C09}" type="datetimeFigureOut">
               <a:rPr lang="en-US" smtClean="0"/>
               <a:pPr/>
-              <a:t>8/14/2022</a:t>
+              <a:t>8/15/2022</a:t>
             </a:fld>
             <a:endParaRPr lang="en-US"/>
           </a:p>
@@ -2599,35 +2612,35 @@
           <a:p>
             <a:pPr lvl="0" eaLnBrk="1" latinLnBrk="0" hangingPunct="1"/>
             <a:r>
-              <a:rPr lang="en-US" smtClean="0"/>
+              <a:rPr lang="en-US"/>
               <a:t>Click to edit Master text styles</a:t>
             </a:r>
           </a:p>
           <a:p>
             <a:pPr lvl="1" eaLnBrk="1" latinLnBrk="0" hangingPunct="1"/>
             <a:r>
-              <a:rPr lang="en-US" smtClean="0"/>
+              <a:rPr lang="en-US"/>
               <a:t>Second level</a:t>
             </a:r>
           </a:p>
           <a:p>
             <a:pPr lvl="2" eaLnBrk="1" latinLnBrk="0" hangingPunct="1"/>
             <a:r>
-              <a:rPr lang="en-US" smtClean="0"/>
+              <a:rPr lang="en-US"/>
               <a:t>Third level</a:t>
             </a:r>
           </a:p>
           <a:p>
             <a:pPr lvl="3" eaLnBrk="1" latinLnBrk="0" hangingPunct="1"/>
             <a:r>
-              <a:rPr lang="en-US" smtClean="0"/>
+              <a:rPr lang="en-US"/>
               <a:t>Fourth level</a:t>
             </a:r>
           </a:p>
           <a:p>
             <a:pPr lvl="4" eaLnBrk="1" latinLnBrk="0" hangingPunct="1"/>
             <a:r>
-              <a:rPr lang="en-US" smtClean="0"/>
+              <a:rPr lang="en-US"/>
               <a:t>Fifth level</a:t>
             </a:r>
             <a:endParaRPr kumimoji="0" lang="en-US"/>
@@ -2656,35 +2669,35 @@
           <a:p>
             <a:pPr lvl="0" eaLnBrk="1" latinLnBrk="0" hangingPunct="1"/>
             <a:r>
-              <a:rPr lang="en-US" smtClean="0"/>
+              <a:rPr lang="en-US"/>
               <a:t>Click to edit Master text styles</a:t>
             </a:r>
           </a:p>
           <a:p>
             <a:pPr lvl="1" eaLnBrk="1" latinLnBrk="0" hangingPunct="1"/>
             <a:r>
-              <a:rPr lang="en-US" smtClean="0"/>
+              <a:rPr lang="en-US"/>
               <a:t>Second level</a:t>
             </a:r>
           </a:p>
           <a:p>
             <a:pPr lvl="2" eaLnBrk="1" latinLnBrk="0" hangingPunct="1"/>
             <a:r>
-              <a:rPr lang="en-US" smtClean="0"/>
+              <a:rPr lang="en-US"/>
               <a:t>Third level</a:t>
             </a:r>
           </a:p>
           <a:p>
             <a:pPr lvl="3" eaLnBrk="1" latinLnBrk="0" hangingPunct="1"/>
             <a:r>
-              <a:rPr lang="en-US" smtClean="0"/>
+              <a:rPr lang="en-US"/>
               <a:t>Fourth level</a:t>
             </a:r>
           </a:p>
           <a:p>
             <a:pPr lvl="4" eaLnBrk="1" latinLnBrk="0" hangingPunct="1"/>
             <a:r>
-              <a:rPr lang="en-US" smtClean="0"/>
+              <a:rPr lang="en-US"/>
               <a:t>Fifth level</a:t>
             </a:r>
             <a:endParaRPr kumimoji="0" lang="en-US"/>
@@ -2741,10 +2754,9 @@
           </a:lstStyle>
           <a:p>
             <a:r>
-              <a:rPr kumimoji="0" lang="en-US" smtClean="0"/>
+              <a:rPr kumimoji="0" lang="en-US"/>
               <a:t>Click to edit Master title style</a:t>
             </a:r>
-            <a:endParaRPr kumimoji="0" lang="en-US"/>
           </a:p>
         </p:txBody>
       </p:sp>
@@ -2766,7 +2778,7 @@
             <a:fld id="{1D8BD707-D9CF-40AE-B4C6-C98DA3205C09}" type="datetimeFigureOut">
               <a:rPr lang="en-US" smtClean="0"/>
               <a:pPr/>
-              <a:t>8/14/2022</a:t>
+              <a:t>8/15/2022</a:t>
             </a:fld>
             <a:endParaRPr lang="en-US"/>
           </a:p>
@@ -2837,35 +2849,35 @@
           <a:p>
             <a:pPr lvl="0" eaLnBrk="1" latinLnBrk="0" hangingPunct="1"/>
             <a:r>
-              <a:rPr lang="en-US" smtClean="0"/>
+              <a:rPr lang="en-US"/>
               <a:t>Click to edit Master text styles</a:t>
             </a:r>
           </a:p>
           <a:p>
             <a:pPr lvl="1" eaLnBrk="1" latinLnBrk="0" hangingPunct="1"/>
             <a:r>
-              <a:rPr lang="en-US" smtClean="0"/>
+              <a:rPr lang="en-US"/>
               <a:t>Second level</a:t>
             </a:r>
           </a:p>
           <a:p>
             <a:pPr lvl="2" eaLnBrk="1" latinLnBrk="0" hangingPunct="1"/>
             <a:r>
-              <a:rPr lang="en-US" smtClean="0"/>
+              <a:rPr lang="en-US"/>
               <a:t>Third level</a:t>
             </a:r>
           </a:p>
           <a:p>
             <a:pPr lvl="3" eaLnBrk="1" latinLnBrk="0" hangingPunct="1"/>
             <a:r>
-              <a:rPr lang="en-US" smtClean="0"/>
+              <a:rPr lang="en-US"/>
               <a:t>Fourth level</a:t>
             </a:r>
           </a:p>
           <a:p>
             <a:pPr lvl="4" eaLnBrk="1" latinLnBrk="0" hangingPunct="1"/>
             <a:r>
-              <a:rPr lang="en-US" smtClean="0"/>
+              <a:rPr lang="en-US"/>
               <a:t>Fifth level</a:t>
             </a:r>
             <a:endParaRPr kumimoji="0" lang="en-US"/>
@@ -2894,35 +2906,35 @@
           <a:p>
             <a:pPr lvl="0" eaLnBrk="1" latinLnBrk="0" hangingPunct="1"/>
             <a:r>
-              <a:rPr lang="en-US" smtClean="0"/>
+              <a:rPr lang="en-US"/>
               <a:t>Click to edit Master text styles</a:t>
             </a:r>
           </a:p>
           <a:p>
             <a:pPr lvl="1" eaLnBrk="1" latinLnBrk="0" hangingPunct="1"/>
             <a:r>
-              <a:rPr lang="en-US" smtClean="0"/>
+              <a:rPr lang="en-US"/>
               <a:t>Second level</a:t>
             </a:r>
           </a:p>
           <a:p>
             <a:pPr lvl="2" eaLnBrk="1" latinLnBrk="0" hangingPunct="1"/>
             <a:r>
-              <a:rPr lang="en-US" smtClean="0"/>
+              <a:rPr lang="en-US"/>
               <a:t>Third level</a:t>
             </a:r>
           </a:p>
           <a:p>
             <a:pPr lvl="3" eaLnBrk="1" latinLnBrk="0" hangingPunct="1"/>
             <a:r>
-              <a:rPr lang="en-US" smtClean="0"/>
+              <a:rPr lang="en-US"/>
               <a:t>Fourth level</a:t>
             </a:r>
           </a:p>
           <a:p>
             <a:pPr lvl="4" eaLnBrk="1" latinLnBrk="0" hangingPunct="1"/>
             <a:r>
-              <a:rPr lang="en-US" smtClean="0"/>
+              <a:rPr lang="en-US"/>
               <a:t>Fifth level</a:t>
             </a:r>
             <a:endParaRPr kumimoji="0" lang="en-US"/>
@@ -2971,7 +2983,7 @@
           <a:p>
             <a:pPr lvl="0" eaLnBrk="1" latinLnBrk="0" hangingPunct="1"/>
             <a:r>
-              <a:rPr kumimoji="0" lang="en-US" smtClean="0"/>
+              <a:rPr kumimoji="0" lang="en-US"/>
               <a:t>Click to edit Master text styles</a:t>
             </a:r>
           </a:p>
@@ -3019,7 +3031,7 @@
           <a:p>
             <a:pPr lvl="0" eaLnBrk="1" latinLnBrk="0" hangingPunct="1"/>
             <a:r>
-              <a:rPr kumimoji="0" lang="en-US" smtClean="0"/>
+              <a:rPr kumimoji="0" lang="en-US"/>
               <a:t>Click to edit Master text styles</a:t>
             </a:r>
           </a:p>
@@ -3066,10 +3078,9 @@
           <a:lstStyle/>
           <a:p>
             <a:r>
-              <a:rPr kumimoji="0" lang="en-US" smtClean="0"/>
+              <a:rPr kumimoji="0" lang="en-US"/>
               <a:t>Click to edit Master title style</a:t>
             </a:r>
-            <a:endParaRPr kumimoji="0" lang="en-US"/>
           </a:p>
         </p:txBody>
       </p:sp>
@@ -3091,7 +3102,7 @@
             <a:fld id="{1D8BD707-D9CF-40AE-B4C6-C98DA3205C09}" type="datetimeFigureOut">
               <a:rPr lang="en-US" smtClean="0"/>
               <a:pPr/>
-              <a:t>8/14/2022</a:t>
+              <a:t>8/15/2022</a:t>
             </a:fld>
             <a:endParaRPr lang="en-US"/>
           </a:p>
@@ -3183,7 +3194,7 @@
             <a:fld id="{1D8BD707-D9CF-40AE-B4C6-C98DA3205C09}" type="datetimeFigureOut">
               <a:rPr lang="en-US" smtClean="0"/>
               <a:pPr/>
-              <a:t>8/14/2022</a:t>
+              <a:t>8/15/2022</a:t>
             </a:fld>
             <a:endParaRPr lang="en-US"/>
           </a:p>
@@ -3327,10 +3338,9 @@
           </a:lstStyle>
           <a:p>
             <a:r>
-              <a:rPr kumimoji="0" lang="en-US" smtClean="0"/>
+              <a:rPr kumimoji="0" lang="en-US"/>
               <a:t>Click to edit Master title style</a:t>
             </a:r>
-            <a:endParaRPr kumimoji="0" lang="en-US"/>
           </a:p>
         </p:txBody>
       </p:sp>
@@ -3383,7 +3393,7 @@
           <a:p>
             <a:pPr lvl="0" eaLnBrk="1" latinLnBrk="0" hangingPunct="1"/>
             <a:r>
-              <a:rPr kumimoji="0" lang="en-US" smtClean="0"/>
+              <a:rPr kumimoji="0" lang="en-US"/>
               <a:t>Click to edit Master text styles</a:t>
             </a:r>
           </a:p>
@@ -3649,35 +3659,35 @@
           <a:p>
             <a:pPr lvl="0" eaLnBrk="1" latinLnBrk="0" hangingPunct="1"/>
             <a:r>
-              <a:rPr lang="en-US" smtClean="0"/>
+              <a:rPr lang="en-US"/>
               <a:t>Click to edit Master text styles</a:t>
             </a:r>
           </a:p>
           <a:p>
             <a:pPr lvl="1" eaLnBrk="1" latinLnBrk="0" hangingPunct="1"/>
             <a:r>
-              <a:rPr lang="en-US" smtClean="0"/>
+              <a:rPr lang="en-US"/>
               <a:t>Second level</a:t>
             </a:r>
           </a:p>
           <a:p>
             <a:pPr lvl="2" eaLnBrk="1" latinLnBrk="0" hangingPunct="1"/>
             <a:r>
-              <a:rPr lang="en-US" smtClean="0"/>
+              <a:rPr lang="en-US"/>
               <a:t>Third level</a:t>
             </a:r>
           </a:p>
           <a:p>
             <a:pPr lvl="3" eaLnBrk="1" latinLnBrk="0" hangingPunct="1"/>
             <a:r>
-              <a:rPr lang="en-US" smtClean="0"/>
+              <a:rPr lang="en-US"/>
               <a:t>Fourth level</a:t>
             </a:r>
           </a:p>
           <a:p>
             <a:pPr lvl="4" eaLnBrk="1" latinLnBrk="0" hangingPunct="1"/>
             <a:r>
-              <a:rPr lang="en-US" smtClean="0"/>
+              <a:rPr lang="en-US"/>
               <a:t>Fifth level</a:t>
             </a:r>
             <a:endParaRPr kumimoji="0" lang="en-US"/>
@@ -3702,7 +3712,7 @@
             <a:fld id="{1D8BD707-D9CF-40AE-B4C6-C98DA3205C09}" type="datetimeFigureOut">
               <a:rPr lang="en-US" smtClean="0"/>
               <a:pPr/>
-              <a:t>8/14/2022</a:t>
+              <a:t>8/15/2022</a:t>
             </a:fld>
             <a:endParaRPr lang="en-US"/>
           </a:p>
@@ -3883,10 +3893,9 @@
           </a:lstStyle>
           <a:p>
             <a:r>
-              <a:rPr kumimoji="0" lang="en-US" smtClean="0"/>
+              <a:rPr kumimoji="0" lang="en-US"/>
               <a:t>Click to edit Master title style</a:t>
             </a:r>
-            <a:endParaRPr kumimoji="0" lang="en-US"/>
           </a:p>
         </p:txBody>
       </p:sp>
@@ -3942,7 +3951,7 @@
               <a:buNone/>
             </a:pPr>
             <a:r>
-              <a:rPr kumimoji="0" lang="en-US" smtClean="0"/>
+              <a:rPr kumimoji="0" lang="en-US"/>
               <a:t>Click icon to add picture</a:t>
             </a:r>
             <a:endParaRPr kumimoji="0" lang="en-US" dirty="0"/>
@@ -3997,7 +4006,7 @@
           <a:p>
             <a:pPr lvl="0" eaLnBrk="1" latinLnBrk="0" hangingPunct="1"/>
             <a:r>
-              <a:rPr kumimoji="0" lang="en-US" smtClean="0"/>
+              <a:rPr kumimoji="0" lang="en-US"/>
               <a:t>Click to edit Master text styles</a:t>
             </a:r>
           </a:p>
@@ -4215,7 +4224,7 @@
             <a:fld id="{1D8BD707-D9CF-40AE-B4C6-C98DA3205C09}" type="datetimeFigureOut">
               <a:rPr lang="en-US" smtClean="0"/>
               <a:pPr/>
-              <a:t>8/14/2022</a:t>
+              <a:t>8/15/2022</a:t>
             </a:fld>
             <a:endParaRPr lang="en-US"/>
           </a:p>
@@ -4359,10 +4368,9 @@
           <a:lstStyle/>
           <a:p>
             <a:r>
-              <a:rPr kumimoji="0" lang="en-US" smtClean="0"/>
+              <a:rPr kumimoji="0" lang="en-US"/>
               <a:t>Click to edit Master title style</a:t>
             </a:r>
-            <a:endParaRPr kumimoji="0" lang="en-US"/>
           </a:p>
         </p:txBody>
       </p:sp>
@@ -4393,38 +4401,37 @@
           <a:p>
             <a:pPr lvl="0" eaLnBrk="1" latinLnBrk="0" hangingPunct="1"/>
             <a:r>
-              <a:rPr kumimoji="0" lang="en-US" smtClean="0"/>
+              <a:rPr kumimoji="0" lang="en-US"/>
               <a:t>Click to edit Master text styles</a:t>
             </a:r>
           </a:p>
           <a:p>
             <a:pPr lvl="1" eaLnBrk="1" latinLnBrk="0" hangingPunct="1"/>
             <a:r>
-              <a:rPr kumimoji="0" lang="en-US" smtClean="0"/>
+              <a:rPr kumimoji="0" lang="en-US"/>
               <a:t>Second level</a:t>
             </a:r>
           </a:p>
           <a:p>
             <a:pPr lvl="2" eaLnBrk="1" latinLnBrk="0" hangingPunct="1"/>
             <a:r>
-              <a:rPr kumimoji="0" lang="en-US" smtClean="0"/>
+              <a:rPr kumimoji="0" lang="en-US"/>
               <a:t>Third level</a:t>
             </a:r>
           </a:p>
           <a:p>
             <a:pPr lvl="3" eaLnBrk="1" latinLnBrk="0" hangingPunct="1"/>
             <a:r>
-              <a:rPr kumimoji="0" lang="en-US" smtClean="0"/>
+              <a:rPr kumimoji="0" lang="en-US"/>
               <a:t>Fourth level</a:t>
             </a:r>
           </a:p>
           <a:p>
             <a:pPr lvl="4" eaLnBrk="1" latinLnBrk="0" hangingPunct="1"/>
             <a:r>
-              <a:rPr kumimoji="0" lang="en-US" smtClean="0"/>
+              <a:rPr kumimoji="0" lang="en-US"/>
               <a:t>Fifth level</a:t>
             </a:r>
-            <a:endParaRPr kumimoji="0" lang="en-US"/>
           </a:p>
         </p:txBody>
       </p:sp>
@@ -4462,7 +4469,7 @@
             <a:fld id="{1D8BD707-D9CF-40AE-B4C6-C98DA3205C09}" type="datetimeFigureOut">
               <a:rPr lang="en-US" smtClean="0"/>
               <a:pPr/>
-              <a:t>8/14/2022</a:t>
+              <a:t>8/15/2022</a:t>
             </a:fld>
             <a:endParaRPr lang="en-US"/>
           </a:p>
@@ -5148,89 +5155,164 @@
         </p:nvSpPr>
         <p:spPr>
           <a:xfrm>
-            <a:off x="2209801" y="2228850"/>
-            <a:ext cx="6934200" cy="2400300"/>
+            <a:off x="4495800" y="2667000"/>
+            <a:ext cx="4648200" cy="2438400"/>
           </a:xfrm>
           <a:solidFill>
-            <a:schemeClr val="accent1">
-              <a:lumMod val="50000"/>
-            </a:schemeClr>
+            <a:srgbClr val="9A3D01">
+              <a:alpha val="56863"/>
+            </a:srgbClr>
           </a:solidFill>
           <a:ln>
             <a:noFill/>
           </a:ln>
+          <a:effectLst>
+            <a:outerShdw blurRad="44450" dist="27940" dir="5400000" algn="ctr">
+              <a:srgbClr val="000000">
+                <a:alpha val="32000"/>
+              </a:srgbClr>
+            </a:outerShdw>
+          </a:effectLst>
         </p:spPr>
         <p:txBody>
           <a:bodyPr>
-            <a:normAutofit fontScale="90000"/>
+            <a:noAutofit/>
           </a:bodyPr>
           <a:lstStyle/>
           <a:p>
-            <a:r>
-              <a:rPr lang="en-US" sz="5300" dirty="0" smtClean="0">
+            <a:pPr algn="r"/>
+            <a:br>
+              <a:rPr lang="en-US" sz="5400" dirty="0">
                 <a:solidFill>
                   <a:schemeClr val="accent1">
                     <a:lumMod val="20000"/>
                     <a:lumOff val="80000"/>
                   </a:schemeClr>
                 </a:solidFill>
+                <a:effectLst>
+                  <a:outerShdw blurRad="50800" dist="38100" algn="l" rotWithShape="0">
+                    <a:prstClr val="black">
+                      <a:alpha val="40000"/>
+                    </a:prstClr>
+                  </a:outerShdw>
+                  <a:reflection blurRad="114300" stA="52000" endPos="24000" dir="5400000" sy="-100000" algn="bl" rotWithShape="0"/>
+                </a:effectLst>
                 <a:latin typeface="Gabriola" pitchFamily="82" charset="0"/>
               </a:rPr>
-              <a:t/>
-            </a:r>
-            <a:br>
-              <a:rPr lang="en-US" sz="5300" dirty="0" smtClean="0">
+            </a:br>
+            <a:r>
+              <a:rPr lang="en-US" sz="3600" dirty="0">
                 <a:solidFill>
                   <a:schemeClr val="accent1">
                     <a:lumMod val="20000"/>
                     <a:lumOff val="80000"/>
                   </a:schemeClr>
                 </a:solidFill>
+                <a:effectLst>
+                  <a:outerShdw blurRad="50800" dist="38100" algn="l" rotWithShape="0">
+                    <a:prstClr val="black">
+                      <a:alpha val="40000"/>
+                    </a:prstClr>
+                  </a:outerShdw>
+                  <a:reflection blurRad="114300" stA="52000" endPos="24000" dir="5400000" sy="-100000" algn="bl" rotWithShape="0"/>
+                </a:effectLst>
                 <a:latin typeface="Gabriola" pitchFamily="82" charset="0"/>
               </a:rPr>
-            </a:br>
-            <a:r>
-              <a:rPr lang="en-US" sz="5300" dirty="0" smtClean="0">
+              <a:t>ORANGE-FLESHED  SWEET POTATO </a:t>
+            </a:r>
+            <a:br>
+              <a:rPr lang="en-US" sz="3600" dirty="0">
                 <a:solidFill>
                   <a:schemeClr val="accent1">
                     <a:lumMod val="20000"/>
                     <a:lumOff val="80000"/>
                   </a:schemeClr>
                 </a:solidFill>
+                <a:effectLst>
+                  <a:outerShdw blurRad="50800" dist="38100" algn="l" rotWithShape="0">
+                    <a:prstClr val="black">
+                      <a:alpha val="40000"/>
+                    </a:prstClr>
+                  </a:outerShdw>
+                  <a:reflection blurRad="114300" stA="52000" endPos="24000" dir="5400000" sy="-100000" algn="bl" rotWithShape="0"/>
+                </a:effectLst>
                 <a:latin typeface="Gabriola" pitchFamily="82" charset="0"/>
               </a:rPr>
-              <a:t>SWEET POTATO </a:t>
-            </a:r>
-            <a:br>
-              <a:rPr lang="en-US" sz="5300" dirty="0" smtClean="0">
+            </a:br>
+            <a:r>
+              <a:rPr lang="en-US" sz="3600" dirty="0">
                 <a:solidFill>
                   <a:schemeClr val="accent1">
                     <a:lumMod val="20000"/>
                     <a:lumOff val="80000"/>
                   </a:schemeClr>
                 </a:solidFill>
+                <a:effectLst>
+                  <a:outerShdw blurRad="50800" dist="38100" algn="l" rotWithShape="0">
+                    <a:prstClr val="black">
+                      <a:alpha val="40000"/>
+                    </a:prstClr>
+                  </a:outerShdw>
+                  <a:reflection blurRad="114300" stA="52000" endPos="24000" dir="5400000" sy="-100000" algn="bl" rotWithShape="0"/>
+                </a:effectLst>
                 <a:latin typeface="Gabriola" pitchFamily="82" charset="0"/>
               </a:rPr>
-            </a:br>
-            <a:r>
-              <a:rPr lang="en-US" sz="5300" dirty="0" smtClean="0">
+              <a:t>MARKETABLE  YIELD </a:t>
+            </a:r>
+            <a:br>
+              <a:rPr lang="en-US" sz="3600" dirty="0">
                 <a:solidFill>
                   <a:schemeClr val="accent1">
                     <a:lumMod val="20000"/>
                     <a:lumOff val="80000"/>
                   </a:schemeClr>
                 </a:solidFill>
+                <a:effectLst>
+                  <a:outerShdw blurRad="50800" dist="38100" algn="l" rotWithShape="0">
+                    <a:prstClr val="black">
+                      <a:alpha val="40000"/>
+                    </a:prstClr>
+                  </a:outerShdw>
+                  <a:reflection blurRad="114300" stA="52000" endPos="24000" dir="5400000" sy="-100000" algn="bl" rotWithShape="0"/>
+                </a:effectLst>
                 <a:latin typeface="Gabriola" pitchFamily="82" charset="0"/>
               </a:rPr>
-              <a:t>MARKETABLE  YIELD PREDICTION APPLICATION</a:t>
-            </a:r>
-            <a:endParaRPr lang="en-US" dirty="0">
+            </a:br>
+            <a:r>
+              <a:rPr lang="en-US" sz="3600" dirty="0">
+                <a:solidFill>
+                  <a:schemeClr val="accent1">
+                    <a:lumMod val="20000"/>
+                    <a:lumOff val="80000"/>
+                  </a:schemeClr>
+                </a:solidFill>
+                <a:effectLst>
+                  <a:outerShdw blurRad="50800" dist="38100" algn="l" rotWithShape="0">
+                    <a:prstClr val="black">
+                      <a:alpha val="40000"/>
+                    </a:prstClr>
+                  </a:outerShdw>
+                  <a:reflection blurRad="114300" stA="52000" endPos="24000" dir="5400000" sy="-100000" algn="bl" rotWithShape="0"/>
+                </a:effectLst>
+                <a:latin typeface="Gabriola" pitchFamily="82" charset="0"/>
+              </a:rPr>
+              <a:t>PREDICTION APPLICATION</a:t>
+            </a:r>
+            <a:endParaRPr lang="en-US" sz="2800" dirty="0">
               <a:solidFill>
                 <a:schemeClr val="accent1">
                   <a:lumMod val="20000"/>
                   <a:lumOff val="80000"/>
                 </a:schemeClr>
               </a:solidFill>
+              <a:effectLst>
+                <a:outerShdw blurRad="50800" dist="38100" algn="l" rotWithShape="0">
+                  <a:prstClr val="black">
+                    <a:alpha val="40000"/>
+                  </a:prstClr>
+                </a:outerShdw>
+                <a:reflection blurRad="114300" stA="52000" endPos="24000" dir="5400000" sy="-100000" algn="bl" rotWithShape="0"/>
+              </a:effectLst>
               <a:latin typeface="Gabriola" pitchFamily="82" charset="0"/>
             </a:endParaRPr>
           </a:p>
@@ -5258,13 +5340,6 @@
       </p:transition>
     </mc:Fallback>
   </mc:AlternateContent>
-  <p:timing>
-    <p:tnLst>
-      <p:par>
-        <p:cTn id="1" dur="indefinite" restart="never" nodeType="tmRoot"/>
-      </p:par>
-    </p:tnLst>
-  </p:timing>
 </p:sld>
 </file>
 
@@ -5297,10 +5372,845 @@
         </p:nvSpPr>
         <p:spPr>
           <a:xfrm>
-            <a:off x="457200" y="381000"/>
-            <a:ext cx="7467600" cy="731838"/>
-          </a:xfrm>
-        </p:spPr>
+            <a:off x="457200" y="152400"/>
+            <a:ext cx="7467600" cy="1143000"/>
+          </a:xfrm>
+        </p:spPr>
+        <p:txBody>
+          <a:bodyPr/>
+          <a:lstStyle/>
+          <a:p>
+            <a:r>
+              <a:rPr lang="en-US" dirty="0"/>
+              <a:t>DATA PRE-PROCESSING AND SPLITTING</a:t>
+            </a:r>
+          </a:p>
+        </p:txBody>
+      </p:sp>
+      <p:pic>
+        <p:nvPicPr>
+          <p:cNvPr id="6" name="Content Placeholder 5"/>
+          <p:cNvPicPr>
+            <a:picLocks noGrp="1" noChangeAspect="1"/>
+          </p:cNvPicPr>
+          <p:nvPr>
+            <p:ph sz="quarter" idx="1"/>
+          </p:nvPr>
+        </p:nvPicPr>
+        <p:blipFill>
+          <a:blip r:embed="rId2">
+            <a:extLst>
+              <a:ext uri="{28A0092B-C50C-407E-A947-70E740481C1C}">
+                <a14:useLocalDpi xmlns:a14="http://schemas.microsoft.com/office/drawing/2010/main" val="0"/>
+              </a:ext>
+            </a:extLst>
+          </a:blip>
+          <a:stretch>
+            <a:fillRect/>
+          </a:stretch>
+        </p:blipFill>
+        <p:spPr>
+          <a:xfrm>
+            <a:off x="457200" y="4800600"/>
+            <a:ext cx="7467600" cy="1768934"/>
+          </a:xfrm>
+        </p:spPr>
+      </p:pic>
+      <p:pic>
+        <p:nvPicPr>
+          <p:cNvPr id="7" name="Picture 6"/>
+          <p:cNvPicPr>
+            <a:picLocks noChangeAspect="1"/>
+          </p:cNvPicPr>
+          <p:nvPr/>
+        </p:nvPicPr>
+        <p:blipFill>
+          <a:blip r:embed="rId3">
+            <a:extLst>
+              <a:ext uri="{28A0092B-C50C-407E-A947-70E740481C1C}">
+                <a14:useLocalDpi xmlns:a14="http://schemas.microsoft.com/office/drawing/2010/main" val="0"/>
+              </a:ext>
+            </a:extLst>
+          </a:blip>
+          <a:stretch>
+            <a:fillRect/>
+          </a:stretch>
+        </p:blipFill>
+        <p:spPr>
+          <a:xfrm>
+            <a:off x="0" y="1524000"/>
+            <a:ext cx="8686800" cy="2743200"/>
+          </a:xfrm>
+          <a:prstGeom prst="rect">
+            <a:avLst/>
+          </a:prstGeom>
+        </p:spPr>
+      </p:pic>
+    </p:spTree>
+    <p:extLst>
+      <p:ext uri="{BB962C8B-B14F-4D97-AF65-F5344CB8AC3E}">
+        <p14:creationId xmlns:p14="http://schemas.microsoft.com/office/powerpoint/2010/main" val="372625396"/>
+      </p:ext>
+    </p:extLst>
+  </p:cSld>
+  <p:clrMapOvr>
+    <a:masterClrMapping/>
+  </p:clrMapOvr>
+  <p:transition spd="slow">
+    <p:wipe/>
+  </p:transition>
+</p:sld>
+</file>
+
+<file path=ppt/slides/slide11.xml><?xml version="1.0" encoding="utf-8"?>
+<p:sld xmlns:a="http://schemas.openxmlformats.org/drawingml/2006/main" xmlns:r="http://schemas.openxmlformats.org/officeDocument/2006/relationships" xmlns:p="http://schemas.openxmlformats.org/presentationml/2006/main">
+  <p:cSld>
+    <p:spTree>
+      <p:nvGrpSpPr>
+        <p:cNvPr id="1" name=""/>
+        <p:cNvGrpSpPr/>
+        <p:nvPr/>
+      </p:nvGrpSpPr>
+      <p:grpSpPr>
+        <a:xfrm>
+          <a:off x="0" y="0"/>
+          <a:ext cx="0" cy="0"/>
+          <a:chOff x="0" y="0"/>
+          <a:chExt cx="0" cy="0"/>
+        </a:xfrm>
+      </p:grpSpPr>
+      <p:sp>
+        <p:nvSpPr>
+          <p:cNvPr id="5" name="Title 4"/>
+          <p:cNvSpPr>
+            <a:spLocks noGrp="1"/>
+          </p:cNvSpPr>
+          <p:nvPr>
+            <p:ph type="title"/>
+          </p:nvPr>
+        </p:nvSpPr>
+        <p:spPr>
+          <a:xfrm>
+            <a:off x="304800" y="228600"/>
+            <a:ext cx="7467600" cy="655638"/>
+          </a:xfrm>
+        </p:spPr>
+        <p:txBody>
+          <a:bodyPr>
+            <a:normAutofit fontScale="90000"/>
+          </a:bodyPr>
+          <a:lstStyle/>
+          <a:p>
+            <a:r>
+              <a:rPr lang="en-US" sz="4000" dirty="0"/>
+              <a:t>MODEL EVALUATION</a:t>
+            </a:r>
+          </a:p>
+        </p:txBody>
+      </p:sp>
+      <p:graphicFrame>
+        <p:nvGraphicFramePr>
+          <p:cNvPr id="9" name="Content Placeholder 8"/>
+          <p:cNvGraphicFramePr>
+            <a:graphicFrameLocks noGrp="1"/>
+          </p:cNvGraphicFramePr>
+          <p:nvPr>
+            <p:ph sz="quarter" idx="1"/>
+            <p:extLst>
+              <p:ext uri="{D42A27DB-BD31-4B8C-83A1-F6EECF244321}">
+                <p14:modId xmlns:p14="http://schemas.microsoft.com/office/powerpoint/2010/main" val="3706474294"/>
+              </p:ext>
+            </p:extLst>
+          </p:nvPr>
+        </p:nvGraphicFramePr>
+        <p:xfrm>
+          <a:off x="304800" y="990600"/>
+          <a:ext cx="8458200" cy="5410202"/>
+        </p:xfrm>
+        <a:graphic>
+          <a:graphicData uri="http://schemas.openxmlformats.org/drawingml/2006/table">
+            <a:tbl>
+              <a:tblPr firstRow="1" bandRow="1">
+                <a:tableStyleId>{5C22544A-7EE6-4342-B048-85BDC9FD1C3A}</a:tableStyleId>
+              </a:tblPr>
+              <a:tblGrid>
+                <a:gridCol w="2667000">
+                  <a:extLst>
+                    <a:ext uri="{9D8B030D-6E8A-4147-A177-3AD203B41FA5}">
+                      <a16:colId xmlns:a16="http://schemas.microsoft.com/office/drawing/2014/main" val="20000"/>
+                    </a:ext>
+                  </a:extLst>
+                </a:gridCol>
+                <a:gridCol w="2819400">
+                  <a:extLst>
+                    <a:ext uri="{9D8B030D-6E8A-4147-A177-3AD203B41FA5}">
+                      <a16:colId xmlns:a16="http://schemas.microsoft.com/office/drawing/2014/main" val="20001"/>
+                    </a:ext>
+                  </a:extLst>
+                </a:gridCol>
+                <a:gridCol w="2971800">
+                  <a:extLst>
+                    <a:ext uri="{9D8B030D-6E8A-4147-A177-3AD203B41FA5}">
+                      <a16:colId xmlns:a16="http://schemas.microsoft.com/office/drawing/2014/main" val="20002"/>
+                    </a:ext>
+                  </a:extLst>
+                </a:gridCol>
+              </a:tblGrid>
+              <a:tr h="488189">
+                <a:tc>
+                  <a:txBody>
+                    <a:bodyPr/>
+                    <a:lstStyle/>
+                    <a:p>
+                      <a:pPr algn="ctr"/>
+                      <a:r>
+                        <a:rPr lang="en-US" dirty="0"/>
+                        <a:t>MODEL</a:t>
+                      </a:r>
+                    </a:p>
+                  </a:txBody>
+                  <a:tcPr/>
+                </a:tc>
+                <a:tc>
+                  <a:txBody>
+                    <a:bodyPr/>
+                    <a:lstStyle/>
+                    <a:p>
+                      <a:pPr algn="ctr"/>
+                      <a:r>
+                        <a:rPr lang="en-US" dirty="0"/>
+                        <a:t>Mean</a:t>
+                      </a:r>
+                      <a:r>
+                        <a:rPr lang="en-US" baseline="0" dirty="0"/>
+                        <a:t> Absolute Error</a:t>
+                      </a:r>
+                      <a:endParaRPr lang="en-US" dirty="0"/>
+                    </a:p>
+                  </a:txBody>
+                  <a:tcPr/>
+                </a:tc>
+                <a:tc>
+                  <a:txBody>
+                    <a:bodyPr/>
+                    <a:lstStyle/>
+                    <a:p>
+                      <a:pPr algn="ctr"/>
+                      <a:r>
+                        <a:rPr lang="en-US" dirty="0"/>
+                        <a:t>Mean</a:t>
+                      </a:r>
+                      <a:r>
+                        <a:rPr lang="en-US" baseline="0" dirty="0"/>
+                        <a:t> Squared Error</a:t>
+                      </a:r>
+                      <a:endParaRPr lang="en-US" dirty="0"/>
+                    </a:p>
+                  </a:txBody>
+                  <a:tcPr/>
+                </a:tc>
+                <a:extLst>
+                  <a:ext uri="{0D108BD9-81ED-4DB2-BD59-A6C34878D82A}">
+                    <a16:rowId xmlns:a16="http://schemas.microsoft.com/office/drawing/2014/main" val="10000"/>
+                  </a:ext>
+                </a:extLst>
+              </a:tr>
+              <a:tr h="514938">
+                <a:tc>
+                  <a:txBody>
+                    <a:bodyPr/>
+                    <a:lstStyle/>
+                    <a:p>
+                      <a:r>
+                        <a:rPr lang="en-US" dirty="0"/>
+                        <a:t>Linear </a:t>
+                      </a:r>
+                      <a:r>
+                        <a:rPr lang="en-US" dirty="0" err="1"/>
+                        <a:t>Regressor</a:t>
+                      </a:r>
+                      <a:r>
+                        <a:rPr lang="en-US" dirty="0"/>
+                        <a:t> </a:t>
+                      </a:r>
+                    </a:p>
+                  </a:txBody>
+                  <a:tcPr/>
+                </a:tc>
+                <a:tc>
+                  <a:txBody>
+                    <a:bodyPr/>
+                    <a:lstStyle/>
+                    <a:p>
+                      <a:pPr algn="ctr"/>
+                      <a:r>
+                        <a:rPr lang="en-US" dirty="0"/>
+                        <a:t>0.003</a:t>
+                      </a:r>
+                    </a:p>
+                  </a:txBody>
+                  <a:tcPr/>
+                </a:tc>
+                <a:tc>
+                  <a:txBody>
+                    <a:bodyPr/>
+                    <a:lstStyle/>
+                    <a:p>
+                      <a:pPr algn="ctr"/>
+                      <a:r>
+                        <a:rPr lang="en-US" dirty="0"/>
+                        <a:t>1.111</a:t>
+                      </a:r>
+                    </a:p>
+                  </a:txBody>
+                  <a:tcPr/>
+                </a:tc>
+                <a:extLst>
+                  <a:ext uri="{0D108BD9-81ED-4DB2-BD59-A6C34878D82A}">
+                    <a16:rowId xmlns:a16="http://schemas.microsoft.com/office/drawing/2014/main" val="10001"/>
+                  </a:ext>
+                </a:extLst>
+              </a:tr>
+              <a:tr h="501563">
+                <a:tc>
+                  <a:txBody>
+                    <a:bodyPr/>
+                    <a:lstStyle/>
+                    <a:p>
+                      <a:r>
+                        <a:rPr lang="en-US" dirty="0"/>
+                        <a:t>Gamma</a:t>
+                      </a:r>
+                      <a:r>
+                        <a:rPr lang="en-US" baseline="0" dirty="0"/>
+                        <a:t> </a:t>
+                      </a:r>
+                      <a:r>
+                        <a:rPr lang="en-US" dirty="0" err="1"/>
+                        <a:t>Regressor</a:t>
+                      </a:r>
+                      <a:endParaRPr lang="en-US" dirty="0"/>
+                    </a:p>
+                  </a:txBody>
+                  <a:tcPr/>
+                </a:tc>
+                <a:tc>
+                  <a:txBody>
+                    <a:bodyPr/>
+                    <a:lstStyle/>
+                    <a:p>
+                      <a:pPr algn="ctr"/>
+                      <a:r>
+                        <a:rPr lang="en-US" dirty="0"/>
+                        <a:t>1.382</a:t>
+                      </a:r>
+                    </a:p>
+                  </a:txBody>
+                  <a:tcPr/>
+                </a:tc>
+                <a:tc>
+                  <a:txBody>
+                    <a:bodyPr/>
+                    <a:lstStyle/>
+                    <a:p>
+                      <a:pPr algn="ctr"/>
+                      <a:r>
+                        <a:rPr lang="en-US" dirty="0"/>
+                        <a:t>4.185</a:t>
+                      </a:r>
+                    </a:p>
+                  </a:txBody>
+                  <a:tcPr/>
+                </a:tc>
+                <a:extLst>
+                  <a:ext uri="{0D108BD9-81ED-4DB2-BD59-A6C34878D82A}">
+                    <a16:rowId xmlns:a16="http://schemas.microsoft.com/office/drawing/2014/main" val="10002"/>
+                  </a:ext>
+                </a:extLst>
+              </a:tr>
+              <a:tr h="488189">
+                <a:tc>
+                  <a:txBody>
+                    <a:bodyPr/>
+                    <a:lstStyle/>
+                    <a:p>
+                      <a:r>
+                        <a:rPr lang="en-US" dirty="0"/>
+                        <a:t>Huber </a:t>
+                      </a:r>
+                      <a:r>
+                        <a:rPr lang="en-US" dirty="0" err="1"/>
+                        <a:t>Regressor</a:t>
+                      </a:r>
+                      <a:endParaRPr lang="en-US" dirty="0"/>
+                    </a:p>
+                  </a:txBody>
+                  <a:tcPr/>
+                </a:tc>
+                <a:tc>
+                  <a:txBody>
+                    <a:bodyPr/>
+                    <a:lstStyle/>
+                    <a:p>
+                      <a:pPr algn="ctr"/>
+                      <a:r>
+                        <a:rPr lang="en-US" dirty="0"/>
+                        <a:t>0.053</a:t>
+                      </a:r>
+                    </a:p>
+                  </a:txBody>
+                  <a:tcPr/>
+                </a:tc>
+                <a:tc>
+                  <a:txBody>
+                    <a:bodyPr/>
+                    <a:lstStyle/>
+                    <a:p>
+                      <a:pPr algn="ctr"/>
+                      <a:r>
+                        <a:rPr lang="en-US" dirty="0"/>
+                        <a:t>0.004</a:t>
+                      </a:r>
+                    </a:p>
+                  </a:txBody>
+                  <a:tcPr/>
+                </a:tc>
+                <a:extLst>
+                  <a:ext uri="{0D108BD9-81ED-4DB2-BD59-A6C34878D82A}">
+                    <a16:rowId xmlns:a16="http://schemas.microsoft.com/office/drawing/2014/main" val="10003"/>
+                  </a:ext>
+                </a:extLst>
+              </a:tr>
+              <a:tr h="488189">
+                <a:tc>
+                  <a:txBody>
+                    <a:bodyPr/>
+                    <a:lstStyle/>
+                    <a:p>
+                      <a:r>
+                        <a:rPr lang="en-US" dirty="0"/>
+                        <a:t>Passive Aggressive</a:t>
+                      </a:r>
+                    </a:p>
+                  </a:txBody>
+                  <a:tcPr/>
+                </a:tc>
+                <a:tc>
+                  <a:txBody>
+                    <a:bodyPr/>
+                    <a:lstStyle/>
+                    <a:p>
+                      <a:pPr algn="ctr"/>
+                      <a:r>
+                        <a:rPr lang="en-US" dirty="0"/>
+                        <a:t>0.750</a:t>
+                      </a:r>
+                    </a:p>
+                  </a:txBody>
+                  <a:tcPr/>
+                </a:tc>
+                <a:tc>
+                  <a:txBody>
+                    <a:bodyPr/>
+                    <a:lstStyle/>
+                    <a:p>
+                      <a:pPr algn="ctr"/>
+                      <a:r>
+                        <a:rPr lang="en-US" dirty="0"/>
+                        <a:t>0.820</a:t>
+                      </a:r>
+                    </a:p>
+                  </a:txBody>
+                  <a:tcPr/>
+                </a:tc>
+                <a:extLst>
+                  <a:ext uri="{0D108BD9-81ED-4DB2-BD59-A6C34878D82A}">
+                    <a16:rowId xmlns:a16="http://schemas.microsoft.com/office/drawing/2014/main" val="10004"/>
+                  </a:ext>
+                </a:extLst>
+              </a:tr>
+              <a:tr h="488189">
+                <a:tc>
+                  <a:txBody>
+                    <a:bodyPr/>
+                    <a:lstStyle/>
+                    <a:p>
+                      <a:r>
+                        <a:rPr lang="en-US" dirty="0"/>
+                        <a:t>Poisson </a:t>
+                      </a:r>
+                      <a:r>
+                        <a:rPr lang="en-US" dirty="0" err="1"/>
+                        <a:t>Regressor</a:t>
+                      </a:r>
+                      <a:endParaRPr lang="en-US" dirty="0"/>
+                    </a:p>
+                  </a:txBody>
+                  <a:tcPr/>
+                </a:tc>
+                <a:tc>
+                  <a:txBody>
+                    <a:bodyPr/>
+                    <a:lstStyle/>
+                    <a:p>
+                      <a:pPr algn="ctr"/>
+                      <a:r>
+                        <a:rPr lang="en-US" dirty="0"/>
+                        <a:t>1.236</a:t>
+                      </a:r>
+                    </a:p>
+                  </a:txBody>
+                  <a:tcPr/>
+                </a:tc>
+                <a:tc>
+                  <a:txBody>
+                    <a:bodyPr/>
+                    <a:lstStyle/>
+                    <a:p>
+                      <a:pPr algn="ctr"/>
+                      <a:r>
+                        <a:rPr lang="en-US" dirty="0"/>
+                        <a:t>0.820</a:t>
+                      </a:r>
+                    </a:p>
+                  </a:txBody>
+                  <a:tcPr/>
+                </a:tc>
+                <a:extLst>
+                  <a:ext uri="{0D108BD9-81ED-4DB2-BD59-A6C34878D82A}">
+                    <a16:rowId xmlns:a16="http://schemas.microsoft.com/office/drawing/2014/main" val="10005"/>
+                  </a:ext>
+                </a:extLst>
+              </a:tr>
+              <a:tr h="488189">
+                <a:tc>
+                  <a:txBody>
+                    <a:bodyPr/>
+                    <a:lstStyle/>
+                    <a:p>
+                      <a:r>
+                        <a:rPr lang="en-US" dirty="0" err="1"/>
+                        <a:t>Quantile</a:t>
+                      </a:r>
+                      <a:r>
+                        <a:rPr lang="en-US" dirty="0"/>
+                        <a:t> </a:t>
+                      </a:r>
+                      <a:r>
+                        <a:rPr lang="en-US" dirty="0" err="1"/>
+                        <a:t>Regressor</a:t>
+                      </a:r>
+                      <a:endParaRPr lang="en-US" dirty="0"/>
+                    </a:p>
+                  </a:txBody>
+                  <a:tcPr/>
+                </a:tc>
+                <a:tc>
+                  <a:txBody>
+                    <a:bodyPr/>
+                    <a:lstStyle/>
+                    <a:p>
+                      <a:pPr algn="ctr"/>
+                      <a:r>
+                        <a:rPr lang="en-US" dirty="0"/>
+                        <a:t>4.088</a:t>
+                      </a:r>
+                    </a:p>
+                  </a:txBody>
+                  <a:tcPr/>
+                </a:tc>
+                <a:tc>
+                  <a:txBody>
+                    <a:bodyPr/>
+                    <a:lstStyle/>
+                    <a:p>
+                      <a:pPr algn="ctr"/>
+                      <a:r>
+                        <a:rPr lang="en-US" dirty="0"/>
+                        <a:t>2.576</a:t>
+                      </a:r>
+                    </a:p>
+                  </a:txBody>
+                  <a:tcPr/>
+                </a:tc>
+                <a:extLst>
+                  <a:ext uri="{0D108BD9-81ED-4DB2-BD59-A6C34878D82A}">
+                    <a16:rowId xmlns:a16="http://schemas.microsoft.com/office/drawing/2014/main" val="10006"/>
+                  </a:ext>
+                </a:extLst>
+              </a:tr>
+              <a:tr h="488189">
+                <a:tc>
+                  <a:txBody>
+                    <a:bodyPr/>
+                    <a:lstStyle/>
+                    <a:p>
+                      <a:r>
+                        <a:rPr lang="en-US" dirty="0"/>
+                        <a:t>RANSAC </a:t>
+                      </a:r>
+                      <a:r>
+                        <a:rPr lang="en-US" dirty="0" err="1"/>
+                        <a:t>Regressor</a:t>
+                      </a:r>
+                      <a:endParaRPr lang="en-US" dirty="0"/>
+                    </a:p>
+                  </a:txBody>
+                  <a:tcPr/>
+                </a:tc>
+                <a:tc>
+                  <a:txBody>
+                    <a:bodyPr/>
+                    <a:lstStyle/>
+                    <a:p>
+                      <a:pPr algn="ctr"/>
+                      <a:r>
+                        <a:rPr lang="en-US" dirty="0"/>
+                        <a:t>0.003</a:t>
+                      </a:r>
+                    </a:p>
+                  </a:txBody>
+                  <a:tcPr/>
+                </a:tc>
+                <a:tc>
+                  <a:txBody>
+                    <a:bodyPr/>
+                    <a:lstStyle/>
+                    <a:p>
+                      <a:pPr algn="ctr"/>
+                      <a:r>
+                        <a:rPr lang="en-US" dirty="0"/>
+                        <a:t>34.47</a:t>
+                      </a:r>
+                    </a:p>
+                  </a:txBody>
+                  <a:tcPr/>
+                </a:tc>
+                <a:extLst>
+                  <a:ext uri="{0D108BD9-81ED-4DB2-BD59-A6C34878D82A}">
+                    <a16:rowId xmlns:a16="http://schemas.microsoft.com/office/drawing/2014/main" val="10007"/>
+                  </a:ext>
+                </a:extLst>
+              </a:tr>
+              <a:tr h="488189">
+                <a:tc>
+                  <a:txBody>
+                    <a:bodyPr/>
+                    <a:lstStyle/>
+                    <a:p>
+                      <a:r>
+                        <a:rPr lang="en-US" dirty="0" err="1"/>
+                        <a:t>TheilSen</a:t>
+                      </a:r>
+                      <a:r>
+                        <a:rPr lang="en-US" dirty="0"/>
+                        <a:t> </a:t>
+                      </a:r>
+                      <a:r>
+                        <a:rPr lang="en-US" dirty="0" err="1"/>
+                        <a:t>Regressor</a:t>
+                      </a:r>
+                      <a:endParaRPr lang="en-US" dirty="0"/>
+                    </a:p>
+                  </a:txBody>
+                  <a:tcPr/>
+                </a:tc>
+                <a:tc>
+                  <a:txBody>
+                    <a:bodyPr/>
+                    <a:lstStyle/>
+                    <a:p>
+                      <a:pPr algn="ctr"/>
+                      <a:r>
+                        <a:rPr lang="en-US" dirty="0"/>
+                        <a:t>0.003</a:t>
+                      </a:r>
+                    </a:p>
+                  </a:txBody>
+                  <a:tcPr/>
+                </a:tc>
+                <a:tc>
+                  <a:txBody>
+                    <a:bodyPr/>
+                    <a:lstStyle/>
+                    <a:p>
+                      <a:pPr algn="ctr"/>
+                      <a:r>
+                        <a:rPr lang="en-US" dirty="0"/>
+                        <a:t>1.092</a:t>
+                      </a:r>
+                    </a:p>
+                  </a:txBody>
+                  <a:tcPr/>
+                </a:tc>
+                <a:extLst>
+                  <a:ext uri="{0D108BD9-81ED-4DB2-BD59-A6C34878D82A}">
+                    <a16:rowId xmlns:a16="http://schemas.microsoft.com/office/drawing/2014/main" val="10008"/>
+                  </a:ext>
+                </a:extLst>
+              </a:tr>
+              <a:tr h="488189">
+                <a:tc>
+                  <a:txBody>
+                    <a:bodyPr/>
+                    <a:lstStyle/>
+                    <a:p>
+                      <a:r>
+                        <a:rPr lang="en-US" dirty="0" err="1"/>
+                        <a:t>Tweedie</a:t>
+                      </a:r>
+                      <a:r>
+                        <a:rPr lang="en-US" baseline="0" dirty="0"/>
+                        <a:t> </a:t>
+                      </a:r>
+                      <a:r>
+                        <a:rPr lang="en-US" baseline="0" dirty="0" err="1"/>
+                        <a:t>Regressor</a:t>
+                      </a:r>
+                      <a:endParaRPr lang="en-US" dirty="0"/>
+                    </a:p>
+                  </a:txBody>
+                  <a:tcPr/>
+                </a:tc>
+                <a:tc>
+                  <a:txBody>
+                    <a:bodyPr/>
+                    <a:lstStyle/>
+                    <a:p>
+                      <a:pPr algn="ctr"/>
+                      <a:r>
+                        <a:rPr lang="en-US" dirty="0"/>
+                        <a:t>0.576</a:t>
+                      </a:r>
+                    </a:p>
+                  </a:txBody>
+                  <a:tcPr/>
+                </a:tc>
+                <a:tc>
+                  <a:txBody>
+                    <a:bodyPr/>
+                    <a:lstStyle/>
+                    <a:p>
+                      <a:pPr algn="ctr"/>
+                      <a:r>
+                        <a:rPr lang="en-US" dirty="0"/>
+                        <a:t>0.446</a:t>
+                      </a:r>
+                    </a:p>
+                  </a:txBody>
+                  <a:tcPr/>
+                </a:tc>
+                <a:extLst>
+                  <a:ext uri="{0D108BD9-81ED-4DB2-BD59-A6C34878D82A}">
+                    <a16:rowId xmlns:a16="http://schemas.microsoft.com/office/drawing/2014/main" val="10009"/>
+                  </a:ext>
+                </a:extLst>
+              </a:tr>
+              <a:tr h="488189">
+                <a:tc>
+                  <a:txBody>
+                    <a:bodyPr/>
+                    <a:lstStyle/>
+                    <a:p>
+                      <a:r>
+                        <a:rPr lang="en-US" dirty="0" err="1"/>
+                        <a:t>AdaBoost</a:t>
+                      </a:r>
+                      <a:r>
+                        <a:rPr lang="en-US" dirty="0"/>
+                        <a:t> </a:t>
+                      </a:r>
+                      <a:r>
+                        <a:rPr lang="en-US" dirty="0" err="1"/>
+                        <a:t>Regressor</a:t>
+                      </a:r>
+                      <a:endParaRPr lang="en-US" dirty="0"/>
+                    </a:p>
+                  </a:txBody>
+                  <a:tcPr/>
+                </a:tc>
+                <a:tc>
+                  <a:txBody>
+                    <a:bodyPr/>
+                    <a:lstStyle/>
+                    <a:p>
+                      <a:pPr algn="ctr"/>
+                      <a:r>
+                        <a:rPr lang="en-US" dirty="0"/>
+                        <a:t>0.511</a:t>
+                      </a:r>
+                    </a:p>
+                  </a:txBody>
+                  <a:tcPr/>
+                </a:tc>
+                <a:tc>
+                  <a:txBody>
+                    <a:bodyPr/>
+                    <a:lstStyle/>
+                    <a:p>
+                      <a:pPr algn="ctr"/>
+                      <a:r>
+                        <a:rPr lang="en-US" dirty="0"/>
+                        <a:t>0.443</a:t>
+                      </a:r>
+                    </a:p>
+                  </a:txBody>
+                  <a:tcPr/>
+                </a:tc>
+                <a:extLst>
+                  <a:ext uri="{0D108BD9-81ED-4DB2-BD59-A6C34878D82A}">
+                    <a16:rowId xmlns:a16="http://schemas.microsoft.com/office/drawing/2014/main" val="10010"/>
+                  </a:ext>
+                </a:extLst>
+              </a:tr>
+            </a:tbl>
+          </a:graphicData>
+        </a:graphic>
+      </p:graphicFrame>
+    </p:spTree>
+    <p:extLst>
+      <p:ext uri="{BB962C8B-B14F-4D97-AF65-F5344CB8AC3E}">
+        <p14:creationId xmlns:p14="http://schemas.microsoft.com/office/powerpoint/2010/main" val="1292302375"/>
+      </p:ext>
+    </p:extLst>
+  </p:cSld>
+  <p:clrMapOvr>
+    <a:masterClrMapping/>
+  </p:clrMapOvr>
+  <p:transition spd="slow">
+    <p:push dir="u"/>
+  </p:transition>
+</p:sld>
+</file>
+
+<file path=ppt/slides/slide12.xml><?xml version="1.0" encoding="utf-8"?>
+<p:sld xmlns:a="http://schemas.openxmlformats.org/drawingml/2006/main" xmlns:r="http://schemas.openxmlformats.org/officeDocument/2006/relationships" xmlns:p="http://schemas.openxmlformats.org/presentationml/2006/main">
+  <p:cSld>
+    <p:spTree>
+      <p:nvGrpSpPr>
+        <p:cNvPr id="1" name=""/>
+        <p:cNvGrpSpPr/>
+        <p:nvPr/>
+      </p:nvGrpSpPr>
+      <p:grpSpPr>
+        <a:xfrm>
+          <a:off x="0" y="0"/>
+          <a:ext cx="0" cy="0"/>
+          <a:chOff x="0" y="0"/>
+          <a:chExt cx="0" cy="0"/>
+        </a:xfrm>
+      </p:grpSpPr>
+      <p:sp>
+        <p:nvSpPr>
+          <p:cNvPr id="2" name="Title 1"/>
+          <p:cNvSpPr>
+            <a:spLocks noGrp="1"/>
+          </p:cNvSpPr>
+          <p:nvPr>
+            <p:ph type="title"/>
+          </p:nvPr>
+        </p:nvSpPr>
+        <p:spPr/>
         <p:txBody>
           <a:bodyPr>
             <a:normAutofit/>
@@ -5308,27 +6218,94 @@
           <a:lstStyle/>
           <a:p>
             <a:r>
-              <a:rPr lang="en-US" sz="4000" dirty="0" smtClean="0"/>
-              <a:t>CONCLUSION</a:t>
-            </a:r>
-            <a:endParaRPr lang="en-US" sz="4000" dirty="0"/>
-          </a:p>
-        </p:txBody>
-      </p:sp>
-      <p:sp>
-        <p:nvSpPr>
-          <p:cNvPr id="3" name="Content Placeholder 2"/>
-          <p:cNvSpPr>
-            <a:spLocks noGrp="1"/>
-          </p:cNvSpPr>
+              <a:rPr lang="en-US" sz="4000" dirty="0"/>
+              <a:t>MODEL DEPLOYMENT</a:t>
+            </a:r>
+          </a:p>
+        </p:txBody>
+      </p:sp>
+      <p:pic>
+        <p:nvPicPr>
+          <p:cNvPr id="7" name="Content Placeholder 6">
+            <a:extLst>
+              <a:ext uri="{FF2B5EF4-FFF2-40B4-BE49-F238E27FC236}">
+                <a16:creationId xmlns:a16="http://schemas.microsoft.com/office/drawing/2014/main" id="{37F4114D-C5D1-528D-1524-1A7E722AAD16}"/>
+              </a:ext>
+            </a:extLst>
+          </p:cNvPr>
+          <p:cNvPicPr>
+            <a:picLocks noGrp="1" noChangeAspect="1"/>
+          </p:cNvPicPr>
           <p:nvPr>
             <p:ph sz="quarter" idx="1"/>
           </p:nvPr>
-        </p:nvSpPr>
+        </p:nvPicPr>
+        <p:blipFill>
+          <a:blip r:embed="rId2">
+            <a:extLst>
+              <a:ext uri="{28A0092B-C50C-407E-A947-70E740481C1C}">
+                <a14:useLocalDpi xmlns:a14="http://schemas.microsoft.com/office/drawing/2010/main" val="0"/>
+              </a:ext>
+            </a:extLst>
+          </a:blip>
+          <a:stretch>
+            <a:fillRect/>
+          </a:stretch>
+        </p:blipFill>
         <p:spPr>
           <a:xfrm>
-            <a:off x="457200" y="1066800"/>
-            <a:ext cx="7467600" cy="1295400"/>
+            <a:off x="457200" y="1752600"/>
+            <a:ext cx="8305800" cy="4572000"/>
+          </a:xfrm>
+        </p:spPr>
+      </p:pic>
+    </p:spTree>
+    <p:extLst>
+      <p:ext uri="{BB962C8B-B14F-4D97-AF65-F5344CB8AC3E}">
+        <p14:creationId xmlns:p14="http://schemas.microsoft.com/office/powerpoint/2010/main" val="3219525236"/>
+      </p:ext>
+    </p:extLst>
+  </p:cSld>
+  <p:clrMapOvr>
+    <a:masterClrMapping/>
+  </p:clrMapOvr>
+  <p:transition spd="slow">
+    <p:pull/>
+  </p:transition>
+</p:sld>
+</file>
+
+<file path=ppt/slides/slide13.xml><?xml version="1.0" encoding="utf-8"?>
+<p:sld xmlns:a="http://schemas.openxmlformats.org/drawingml/2006/main" xmlns:r="http://schemas.openxmlformats.org/officeDocument/2006/relationships" xmlns:p="http://schemas.openxmlformats.org/presentationml/2006/main">
+  <p:cSld>
+    <p:spTree>
+      <p:nvGrpSpPr>
+        <p:cNvPr id="1" name=""/>
+        <p:cNvGrpSpPr/>
+        <p:nvPr/>
+      </p:nvGrpSpPr>
+      <p:grpSpPr>
+        <a:xfrm>
+          <a:off x="0" y="0"/>
+          <a:ext cx="0" cy="0"/>
+          <a:chOff x="0" y="0"/>
+          <a:chExt cx="0" cy="0"/>
+        </a:xfrm>
+      </p:grpSpPr>
+      <p:sp>
+        <p:nvSpPr>
+          <p:cNvPr id="2" name="Title 1"/>
+          <p:cNvSpPr>
+            <a:spLocks noGrp="1"/>
+          </p:cNvSpPr>
+          <p:nvPr>
+            <p:ph type="title"/>
+          </p:nvPr>
+        </p:nvSpPr>
+        <p:spPr>
+          <a:xfrm>
+            <a:off x="457200" y="381000"/>
+            <a:ext cx="7467600" cy="731838"/>
           </a:xfrm>
         </p:spPr>
         <p:txBody>
@@ -5337,16 +6314,41 @@
           </a:bodyPr>
           <a:lstStyle/>
           <a:p>
+            <a:r>
+              <a:rPr lang="en-US" sz="4000" dirty="0"/>
+              <a:t>CONCLUSION</a:t>
+            </a:r>
+          </a:p>
+        </p:txBody>
+      </p:sp>
+      <p:sp>
+        <p:nvSpPr>
+          <p:cNvPr id="3" name="Content Placeholder 2"/>
+          <p:cNvSpPr>
+            <a:spLocks noGrp="1"/>
+          </p:cNvSpPr>
+          <p:nvPr>
+            <p:ph sz="quarter" idx="1"/>
+          </p:nvPr>
+        </p:nvSpPr>
+        <p:spPr>
+          <a:xfrm>
+            <a:off x="457200" y="1066800"/>
+            <a:ext cx="7467600" cy="1295400"/>
+          </a:xfrm>
+        </p:spPr>
+        <p:txBody>
+          <a:bodyPr>
+            <a:normAutofit/>
+          </a:bodyPr>
+          <a:lstStyle/>
+          <a:p>
             <a:pPr marL="0" indent="0">
               <a:buNone/>
             </a:pPr>
             <a:r>
-              <a:rPr lang="en-US" sz="2000" dirty="0" smtClean="0"/>
-              <a:t>After the evaluation of all models, the Linear Regression Model was selected for tuning and </a:t>
-            </a:r>
-            <a:r>
-              <a:rPr lang="en-US" sz="2000" dirty="0" smtClean="0"/>
-              <a:t>deployment:</a:t>
+              <a:rPr lang="en-US" sz="2000" dirty="0"/>
+              <a:t>After the evaluation of all models, the Linear Regression Model was selected for tuning and deployment:</a:t>
             </a:r>
             <a:endParaRPr lang="en-US" sz="3200" dirty="0"/>
           </a:p>
@@ -5392,29 +6394,13 @@
   <p:clrMapOvr>
     <a:masterClrMapping/>
   </p:clrMapOvr>
-  <mc:AlternateContent xmlns:mc="http://schemas.openxmlformats.org/markup-compatibility/2006" xmlns:p14="http://schemas.microsoft.com/office/powerpoint/2010/main">
-    <mc:Choice Requires="p14">
-      <p:transition spd="slow" p14:dur="3400">
-        <p14:reveal/>
-      </p:transition>
-    </mc:Choice>
-    <mc:Fallback xmlns="">
-      <p:transition spd="slow">
-        <p:fade/>
-      </p:transition>
-    </mc:Fallback>
-  </mc:AlternateContent>
-  <p:timing>
-    <p:tnLst>
-      <p:par>
-        <p:cTn id="1" dur="indefinite" restart="never" nodeType="tmRoot"/>
-      </p:par>
-    </p:tnLst>
-  </p:timing>
+  <p:transition spd="slow">
+    <p:cover/>
+  </p:transition>
 </p:sld>
 </file>
 
-<file path=ppt/slides/slide11.xml><?xml version="1.0" encoding="utf-8"?>
+<file path=ppt/slides/slide14.xml><?xml version="1.0" encoding="utf-8"?>
 <p:sld xmlns:a="http://schemas.openxmlformats.org/drawingml/2006/main" xmlns:r="http://schemas.openxmlformats.org/officeDocument/2006/relationships" xmlns:p="http://schemas.openxmlformats.org/presentationml/2006/main">
   <p:cSld>
     <p:spTree>
@@ -5455,7 +6441,7 @@
           <a:p>
             <a:pPr algn="ctr"/>
             <a:r>
-              <a:rPr lang="en-US" sz="8000" dirty="0" smtClean="0"/>
+              <a:rPr lang="en-US" sz="8000" dirty="0"/>
               <a:t>THANK YOU FOR LISTENING</a:t>
             </a:r>
             <a:endParaRPr lang="en-US" sz="4800" dirty="0"/>
@@ -5484,13 +6470,6 @@
       </p:transition>
     </mc:Fallback>
   </mc:AlternateContent>
-  <p:timing>
-    <p:tnLst>
-      <p:par>
-        <p:cTn id="1" dur="indefinite" restart="never" nodeType="tmRoot"/>
-      </p:par>
-    </p:tnLst>
-  </p:timing>
 </p:sld>
 </file>
 
@@ -5530,7 +6509,7 @@
           <a:p>
             <a:pPr algn="ctr"/>
             <a:r>
-              <a:rPr lang="en-US" sz="6700" dirty="0" smtClean="0"/>
+              <a:rPr lang="en-US" sz="6700" dirty="0"/>
               <a:t>TEAM MEMBERS</a:t>
             </a:r>
             <a:endParaRPr lang="en-US" sz="4400" dirty="0"/>
@@ -5553,55 +6532,33 @@
           <a:lstStyle/>
           <a:p>
             <a:r>
-              <a:rPr lang="en-US" dirty="0" smtClean="0"/>
-              <a:t>OLAITAN SHARON(PL) -</a:t>
-            </a:r>
-            <a:r>
               <a:rPr lang="en-US" dirty="0"/>
-              <a:t> </a:t>
-            </a:r>
-            <a:r>
-              <a:rPr lang="en-US" dirty="0" smtClean="0"/>
-              <a:t>Data collection, inspection and comprehension of data, data cleaning and processing, model tuning and deployment</a:t>
-            </a:r>
-          </a:p>
-          <a:p>
-            <a:r>
-              <a:rPr lang="en-US" dirty="0" smtClean="0"/>
-              <a:t>SAHEED OKIKIOLA – Data </a:t>
-            </a:r>
-            <a:r>
-              <a:rPr lang="en-US" dirty="0" smtClean="0"/>
-              <a:t>collection, contributions to </a:t>
-            </a:r>
-            <a:r>
-              <a:rPr lang="en-US" smtClean="0"/>
-              <a:t>the group</a:t>
-            </a:r>
-            <a:endParaRPr lang="en-US" dirty="0" smtClean="0"/>
-          </a:p>
-          <a:p>
-            <a:r>
-              <a:rPr lang="en-US" dirty="0" smtClean="0"/>
+              <a:t>OLAITAN SHARON(PL) - Data collection, inspection and comprehension of data, data cleaning and processing, model tuning and deployment</a:t>
+            </a:r>
+          </a:p>
+          <a:p>
+            <a:r>
+              <a:rPr lang="en-US" dirty="0"/>
+              <a:t>SAHEED OKIKIOLA – Data collection, contributions to the group</a:t>
+            </a:r>
+          </a:p>
+          <a:p>
+            <a:r>
+              <a:rPr lang="en-US" dirty="0"/>
               <a:t>AFOLAYAN PEACE – Data collection, inspection and comprehension of data, model performance evaluation, preparation of slides</a:t>
             </a:r>
           </a:p>
           <a:p>
             <a:r>
-              <a:rPr lang="en-US" dirty="0" smtClean="0"/>
+              <a:rPr lang="en-US" dirty="0"/>
               <a:t>OKUNOLA HABEEB – Data collection</a:t>
             </a:r>
           </a:p>
           <a:p>
             <a:r>
-              <a:rPr lang="en-US" dirty="0" smtClean="0"/>
-              <a:t>RAPHAEL – Data </a:t>
-            </a:r>
-            <a:r>
-              <a:rPr lang="en-US" dirty="0" smtClean="0"/>
-              <a:t>collection, contributions to the group</a:t>
-            </a:r>
-            <a:endParaRPr lang="en-US" dirty="0" smtClean="0"/>
+              <a:rPr lang="en-US" dirty="0"/>
+              <a:t>RAPHAEL DAVID-ROBERTS – Data collection, contributions to the group</a:t>
+            </a:r>
           </a:p>
           <a:p>
             <a:endParaRPr lang="en-US" dirty="0"/>
@@ -5621,13 +6578,6 @@
   <p:transition spd="slow">
     <p:randomBar dir="vert"/>
   </p:transition>
-  <p:timing>
-    <p:tnLst>
-      <p:par>
-        <p:cTn id="1" dur="indefinite" restart="never" nodeType="tmRoot"/>
-      </p:par>
-    </p:tnLst>
-  </p:timing>
 </p:sld>
 </file>
 
@@ -5665,20 +6615,21 @@
           </a:xfrm>
         </p:spPr>
         <p:txBody>
-          <a:bodyPr/>
-          <a:lstStyle/>
-          <a:p>
-            <a:r>
-              <a:rPr lang="en-US" dirty="0" smtClean="0"/>
-              <a:t>Increase in popularity and consumption of sweet potatoes.</a:t>
-            </a:r>
-          </a:p>
-          <a:p>
-            <a:r>
-              <a:rPr lang="en-US" dirty="0" smtClean="0"/>
+          <a:bodyPr>
+            <a:normAutofit fontScale="92500"/>
+          </a:bodyPr>
+          <a:lstStyle/>
+          <a:p>
+            <a:r>
+              <a:rPr lang="en-US" dirty="0"/>
+              <a:t>The search for a cheaper, efficient and more nutritious alternative for flour.</a:t>
+            </a:r>
+          </a:p>
+          <a:p>
+            <a:r>
+              <a:rPr lang="en-US" dirty="0"/>
               <a:t>Inability to depict output of sweet potatoes planted.</a:t>
             </a:r>
-            <a:endParaRPr lang="en-US" dirty="0"/>
           </a:p>
         </p:txBody>
       </p:sp>
@@ -5699,20 +6650,21 @@
           </a:xfrm>
         </p:spPr>
         <p:txBody>
-          <a:bodyPr/>
-          <a:lstStyle/>
-          <a:p>
-            <a:r>
-              <a:rPr lang="en-US" dirty="0" smtClean="0"/>
-              <a:t>Collecting data on sweet potatoes which are cheap and more nutritious.</a:t>
-            </a:r>
-          </a:p>
-          <a:p>
-            <a:r>
-              <a:rPr lang="en-US" dirty="0" smtClean="0"/>
+          <a:bodyPr>
+            <a:normAutofit lnSpcReduction="10000"/>
+          </a:bodyPr>
+          <a:lstStyle/>
+          <a:p>
+            <a:r>
+              <a:rPr lang="en-US" dirty="0"/>
+              <a:t>Collecting data on orange-fleshed sweet potatoes which fit the requirements.</a:t>
+            </a:r>
+          </a:p>
+          <a:p>
+            <a:r>
+              <a:rPr lang="en-US" dirty="0"/>
               <a:t>Predict an approximate marketable yield of  sweet potatoes planted.</a:t>
             </a:r>
-            <a:endParaRPr lang="en-US" dirty="0"/>
           </a:p>
         </p:txBody>
       </p:sp>
@@ -5739,7 +6691,7 @@
           <a:lstStyle/>
           <a:p>
             <a:r>
-              <a:rPr lang="en-US" sz="4400" dirty="0" smtClean="0"/>
+              <a:rPr lang="en-US" sz="4400" dirty="0"/>
               <a:t>MOTIVATIONS</a:t>
             </a:r>
             <a:endParaRPr lang="en-US" sz="4000" dirty="0"/>
@@ -5769,7 +6721,7 @@
           <a:lstStyle/>
           <a:p>
             <a:r>
-              <a:rPr lang="en-US" sz="4800" dirty="0" smtClean="0"/>
+              <a:rPr lang="en-US" sz="4800" dirty="0"/>
               <a:t>SOLUTIONS</a:t>
             </a:r>
             <a:endParaRPr lang="en-US" sz="4000" dirty="0"/>
@@ -5839,7 +6791,7 @@
           <a:lstStyle/>
           <a:p>
             <a:r>
-              <a:rPr lang="en-US" sz="3200" b="1" u="sng" dirty="0" smtClean="0"/>
+              <a:rPr lang="en-US" sz="3200" b="1" u="sng" dirty="0"/>
               <a:t>AIM</a:t>
             </a:r>
           </a:p>
@@ -5848,8 +6800,8 @@
           </a:p>
           <a:p>
             <a:r>
-              <a:rPr lang="en-US" sz="2400" dirty="0" smtClean="0"/>
-              <a:t>Our aim is to  create a machine learning  project that predicts the marketable yield of orange-fleshed sweet potatoes and white-fleshed sweet potatoes.</a:t>
+              <a:rPr lang="en-US" sz="2400" dirty="0"/>
+              <a:t>Our aim is to  create a machine learning  project that predicts the marketable yield of orange-fleshed sweet potatoes.</a:t>
             </a:r>
             <a:endParaRPr lang="en-US" dirty="0"/>
           </a:p>
@@ -5877,13 +6829,6 @@
       </p:transition>
     </mc:Fallback>
   </mc:AlternateContent>
-  <p:timing>
-    <p:tnLst>
-      <p:par>
-        <p:cTn id="1" dur="indefinite" restart="never" nodeType="tmRoot"/>
-      </p:par>
-    </p:tnLst>
-  </p:timing>
 </p:sld>
 </file>
 
@@ -5916,67 +6861,86 @@
         </p:nvSpPr>
         <p:spPr>
           <a:xfrm>
-            <a:off x="533400" y="762000"/>
-            <a:ext cx="7543800" cy="1143000"/>
+            <a:off x="457200" y="304800"/>
+            <a:ext cx="7543800" cy="425450"/>
+          </a:xfrm>
+        </p:spPr>
+        <p:txBody>
+          <a:bodyPr/>
+          <a:lstStyle/>
+          <a:p>
+            <a:r>
+              <a:rPr lang="en-US" sz="2000" dirty="0"/>
+              <a:t>BENEFITS OF ORANGE-FLESHED SWEET POTATOES</a:t>
+            </a:r>
+            <a:endParaRPr lang="en-US" dirty="0"/>
+          </a:p>
+        </p:txBody>
+      </p:sp>
+      <p:sp>
+        <p:nvSpPr>
+          <p:cNvPr id="3" name="Content Placeholder 2"/>
+          <p:cNvSpPr>
+            <a:spLocks noGrp="1"/>
+          </p:cNvSpPr>
+          <p:nvPr>
+            <p:ph sz="quarter" idx="2"/>
+          </p:nvPr>
+        </p:nvSpPr>
+        <p:spPr>
+          <a:xfrm>
+            <a:off x="457200" y="990600"/>
+            <a:ext cx="3657600" cy="5257800"/>
           </a:xfrm>
         </p:spPr>
         <p:txBody>
           <a:bodyPr>
-            <a:normAutofit fontScale="90000"/>
+            <a:normAutofit fontScale="92500" lnSpcReduction="10000"/>
           </a:bodyPr>
           <a:lstStyle/>
           <a:p>
             <a:r>
-              <a:rPr lang="en-US" dirty="0" smtClean="0"/>
-              <a:t>GRAPHICAL REPRESENTATION SHOWING THE DISTINCTION BETWEEN WHITE-FLESHED AND ORANGE-FLESHED SWEET POTATOES</a:t>
-            </a:r>
+              <a:rPr lang="en-US" dirty="0"/>
+              <a:t>It is pocket friendly and can be used as an alternative for flour.</a:t>
+            </a:r>
+          </a:p>
+          <a:p>
+            <a:r>
+              <a:rPr lang="en-US" dirty="0"/>
+              <a:t>It is rich in Vitamin A as it contains beta-carotene.</a:t>
+            </a:r>
+          </a:p>
+          <a:p>
+            <a:r>
+              <a:rPr lang="en-US" dirty="0"/>
+              <a:t>It helps control diabetes as it functions as insulin to regulate blood sugar levels, hence, it is also edible to diabetic patients.</a:t>
+            </a:r>
+          </a:p>
+          <a:p>
+            <a:r>
+              <a:rPr lang="en-US" dirty="0"/>
+              <a:t>It has a growth duration of three months from planting to harvest.</a:t>
+            </a:r>
+          </a:p>
+          <a:p>
             <a:endParaRPr lang="en-US" dirty="0"/>
           </a:p>
         </p:txBody>
       </p:sp>
-      <p:pic>
-        <p:nvPicPr>
-          <p:cNvPr id="7" name="Content Placeholder 6"/>
-          <p:cNvPicPr>
-            <a:picLocks noGrp="1" noChangeAspect="1"/>
-          </p:cNvPicPr>
+      <p:sp>
+        <p:nvSpPr>
+          <p:cNvPr id="4" name="Content Placeholder 3"/>
+          <p:cNvSpPr>
+            <a:spLocks noGrp="1"/>
+          </p:cNvSpPr>
           <p:nvPr>
             <p:ph sz="quarter" idx="4"/>
           </p:nvPr>
-        </p:nvPicPr>
-        <p:blipFill>
-          <a:blip r:embed="rId2" cstate="print">
-            <a:extLst>
-              <a:ext uri="{28A0092B-C50C-407E-A947-70E740481C1C}">
-                <a14:useLocalDpi xmlns:a14="http://schemas.microsoft.com/office/drawing/2010/main" val="0"/>
-              </a:ext>
-            </a:extLst>
-          </a:blip>
-          <a:stretch>
-            <a:fillRect/>
-          </a:stretch>
-        </p:blipFill>
+        </p:nvSpPr>
         <p:spPr>
           <a:xfrm>
-            <a:off x="4419600" y="2971800"/>
-            <a:ext cx="3657600" cy="3429000"/>
-          </a:xfrm>
-        </p:spPr>
-      </p:pic>
-      <p:sp>
-        <p:nvSpPr>
-          <p:cNvPr id="5" name="Text Placeholder 4"/>
-          <p:cNvSpPr>
-            <a:spLocks noGrp="1"/>
-          </p:cNvSpPr>
-          <p:nvPr>
-            <p:ph type="body" sz="quarter" idx="1"/>
-          </p:nvPr>
-        </p:nvSpPr>
-        <p:spPr>
-          <a:xfrm>
-            <a:off x="457200" y="1981200"/>
-            <a:ext cx="3657600" cy="658368"/>
+            <a:off x="4371975" y="990600"/>
+            <a:ext cx="3657600" cy="5257800"/>
           </a:xfrm>
         </p:spPr>
         <p:txBody>
@@ -5984,90 +6948,66 @@
           <a:lstStyle/>
           <a:p>
             <a:r>
-              <a:rPr lang="en-US" dirty="0" smtClean="0"/>
-              <a:t>WHITE-FLESHED</a:t>
-            </a:r>
-            <a:endParaRPr lang="en-US" dirty="0"/>
-          </a:p>
-        </p:txBody>
-      </p:sp>
-      <p:sp>
-        <p:nvSpPr>
-          <p:cNvPr id="6" name="Text Placeholder 5"/>
-          <p:cNvSpPr>
-            <a:spLocks noGrp="1"/>
-          </p:cNvSpPr>
-          <p:nvPr>
-            <p:ph type="body" sz="quarter" idx="3"/>
-          </p:nvPr>
-        </p:nvSpPr>
-        <p:spPr>
-          <a:xfrm>
-            <a:off x="4419600" y="1981200"/>
-            <a:ext cx="3657600" cy="658368"/>
-          </a:xfrm>
-        </p:spPr>
-        <p:txBody>
-          <a:bodyPr/>
-          <a:lstStyle/>
-          <a:p>
-            <a:r>
-              <a:rPr lang="en-US" dirty="0" smtClean="0"/>
-              <a:t>ORANGE-FLESHED</a:t>
-            </a:r>
-            <a:endParaRPr lang="en-US" dirty="0"/>
-          </a:p>
-        </p:txBody>
-      </p:sp>
-      <p:pic>
-        <p:nvPicPr>
-          <p:cNvPr id="3" name="Content Placeholder 2"/>
-          <p:cNvPicPr>
-            <a:picLocks noGrp="1" noChangeAspect="1"/>
-          </p:cNvPicPr>
-          <p:nvPr>
-            <p:ph sz="quarter" idx="2"/>
-          </p:nvPr>
-        </p:nvPicPr>
-        <p:blipFill>
-          <a:blip r:embed="rId3" cstate="print">
-            <a:extLst>
-              <a:ext uri="{28A0092B-C50C-407E-A947-70E740481C1C}">
-                <a14:useLocalDpi xmlns:a14="http://schemas.microsoft.com/office/drawing/2010/main" val="0"/>
-              </a:ext>
-            </a:extLst>
-          </a:blip>
-          <a:stretch>
-            <a:fillRect/>
-          </a:stretch>
-        </p:blipFill>
-        <p:spPr>
-          <a:xfrm>
-            <a:off x="457200" y="2895600"/>
-            <a:ext cx="3657600" cy="3505199"/>
-          </a:xfrm>
-        </p:spPr>
-      </p:pic>
+              <a:rPr lang="en-US" dirty="0"/>
+              <a:t>Boosts the immune system.</a:t>
+            </a:r>
+          </a:p>
+          <a:p>
+            <a:r>
+              <a:rPr lang="en-US" dirty="0"/>
+              <a:t>Reduces arthritis pain.</a:t>
+            </a:r>
+          </a:p>
+          <a:p>
+            <a:r>
+              <a:rPr lang="en-US" dirty="0"/>
+              <a:t>Helps prevent dehydration.</a:t>
+            </a:r>
+          </a:p>
+          <a:p>
+            <a:r>
+              <a:rPr lang="en-US" dirty="0"/>
+              <a:t>Treatment of inflammation.</a:t>
+            </a:r>
+          </a:p>
+          <a:p>
+            <a:r>
+              <a:rPr lang="en-US" dirty="0"/>
+              <a:t>Helps improves digestion as it contains </a:t>
+            </a:r>
+            <a:r>
+              <a:rPr lang="en-US" dirty="0" err="1"/>
+              <a:t>fibre</a:t>
+            </a:r>
+            <a:r>
+              <a:rPr lang="en-US" dirty="0"/>
+              <a:t>.</a:t>
+            </a:r>
+          </a:p>
+        </p:txBody>
+      </p:sp>
     </p:spTree>
     <p:extLst>
       <p:ext uri="{BB962C8B-B14F-4D97-AF65-F5344CB8AC3E}">
-        <p14:creationId xmlns:p14="http://schemas.microsoft.com/office/powerpoint/2010/main" val="248086809"/>
+        <p14:creationId xmlns:p14="http://schemas.microsoft.com/office/powerpoint/2010/main" val="1822329003"/>
       </p:ext>
     </p:extLst>
   </p:cSld>
   <p:clrMapOvr>
     <a:masterClrMapping/>
   </p:clrMapOvr>
-  <p:transition spd="slow">
-    <p:wheel spokes="1"/>
-  </p:transition>
-  <p:timing>
-    <p:tnLst>
-      <p:par>
-        <p:cTn id="1" dur="indefinite" restart="never" nodeType="tmRoot"/>
-      </p:par>
-    </p:tnLst>
-  </p:timing>
+  <mc:AlternateContent xmlns:mc="http://schemas.openxmlformats.org/markup-compatibility/2006" xmlns:p14="http://schemas.microsoft.com/office/powerpoint/2010/main">
+    <mc:Choice Requires="p14">
+      <p:transition spd="slow" p14:dur="1600">
+        <p:blinds dir="vert"/>
+      </p:transition>
+    </mc:Choice>
+    <mc:Fallback xmlns="">
+      <p:transition spd="slow">
+        <p:blinds dir="vert"/>
+      </p:transition>
+    </mc:Fallback>
+  </mc:AlternateContent>
 </p:sld>
 </file>
 
@@ -6090,7 +7030,13 @@
       </p:grpSpPr>
       <p:sp>
         <p:nvSpPr>
-          <p:cNvPr id="7" name="Title 6"/>
+          <p:cNvPr id="7" name="Title 6">
+            <a:extLst>
+              <a:ext uri="{FF2B5EF4-FFF2-40B4-BE49-F238E27FC236}">
+                <a16:creationId xmlns:a16="http://schemas.microsoft.com/office/drawing/2014/main" id="{D5AFD8A5-0B4E-1149-E792-F2549AF594BC}"/>
+              </a:ext>
+            </a:extLst>
+          </p:cNvPr>
           <p:cNvSpPr>
             <a:spLocks noGrp="1"/>
           </p:cNvSpPr>
@@ -6098,7 +7044,12 @@
             <p:ph type="title"/>
           </p:nvPr>
         </p:nvSpPr>
-        <p:spPr/>
+        <p:spPr>
+          <a:xfrm>
+            <a:off x="533400" y="381000"/>
+            <a:ext cx="7467600" cy="503238"/>
+          </a:xfrm>
+        </p:spPr>
         <p:txBody>
           <a:bodyPr>
             <a:normAutofit/>
@@ -6106,29 +7057,385 @@
           <a:lstStyle/>
           <a:p>
             <a:r>
-              <a:rPr lang="en-US" b="1" u="sng" dirty="0" smtClean="0">
+              <a:rPr lang="en-GB" sz="1400" dirty="0"/>
+              <a:t>ANALYSIS OF PROFITABILITY OF ORANGE-FLESHED SWEET POTATOES</a:t>
+            </a:r>
+            <a:endParaRPr lang="en-GB" dirty="0"/>
+          </a:p>
+        </p:txBody>
+      </p:sp>
+      <p:pic>
+        <p:nvPicPr>
+          <p:cNvPr id="10" name="Content Placeholder 9">
+            <a:extLst>
+              <a:ext uri="{FF2B5EF4-FFF2-40B4-BE49-F238E27FC236}">
+                <a16:creationId xmlns:a16="http://schemas.microsoft.com/office/drawing/2014/main" id="{BCAC9D0F-0C79-B162-9AB4-D4C7CA59566A}"/>
+              </a:ext>
+            </a:extLst>
+          </p:cNvPr>
+          <p:cNvPicPr>
+            <a:picLocks noGrp="1" noChangeAspect="1"/>
+          </p:cNvPicPr>
+          <p:nvPr>
+            <p:ph sz="quarter" idx="1"/>
+          </p:nvPr>
+        </p:nvPicPr>
+        <p:blipFill rotWithShape="1">
+          <a:blip r:embed="rId2">
+            <a:extLst>
+              <a:ext uri="{28A0092B-C50C-407E-A947-70E740481C1C}">
+                <a14:useLocalDpi xmlns:a14="http://schemas.microsoft.com/office/drawing/2010/main" val="0"/>
+              </a:ext>
+            </a:extLst>
+          </a:blip>
+          <a:srcRect l="1" t="32772" r="-2117" b="37623"/>
+          <a:stretch/>
+        </p:blipFill>
+        <p:spPr>
+          <a:xfrm>
+            <a:off x="152400" y="1295400"/>
+            <a:ext cx="8001000" cy="5181600"/>
+          </a:xfrm>
+        </p:spPr>
+      </p:pic>
+    </p:spTree>
+    <p:extLst>
+      <p:ext uri="{BB962C8B-B14F-4D97-AF65-F5344CB8AC3E}">
+        <p14:creationId xmlns:p14="http://schemas.microsoft.com/office/powerpoint/2010/main" val="2876239670"/>
+      </p:ext>
+    </p:extLst>
+  </p:cSld>
+  <p:clrMapOvr>
+    <a:masterClrMapping/>
+  </p:clrMapOvr>
+  <p:transition spd="slow">
+    <p:cover/>
+  </p:transition>
+</p:sld>
+</file>
+
+<file path=ppt/slides/slide6.xml><?xml version="1.0" encoding="utf-8"?>
+<p:sld xmlns:a="http://schemas.openxmlformats.org/drawingml/2006/main" xmlns:r="http://schemas.openxmlformats.org/officeDocument/2006/relationships" xmlns:p="http://schemas.openxmlformats.org/presentationml/2006/main">
+  <p:cSld>
+    <p:spTree>
+      <p:nvGrpSpPr>
+        <p:cNvPr id="1" name=""/>
+        <p:cNvGrpSpPr/>
+        <p:nvPr/>
+      </p:nvGrpSpPr>
+      <p:grpSpPr>
+        <a:xfrm>
+          <a:off x="0" y="0"/>
+          <a:ext cx="0" cy="0"/>
+          <a:chOff x="0" y="0"/>
+          <a:chExt cx="0" cy="0"/>
+        </a:xfrm>
+      </p:grpSpPr>
+      <p:sp>
+        <p:nvSpPr>
+          <p:cNvPr id="7" name="Title 6"/>
+          <p:cNvSpPr>
+            <a:spLocks noGrp="1"/>
+          </p:cNvSpPr>
+          <p:nvPr>
+            <p:ph type="title"/>
+          </p:nvPr>
+        </p:nvSpPr>
+        <p:spPr/>
+        <p:txBody>
+          <a:bodyPr/>
+          <a:lstStyle/>
+          <a:p>
+            <a:r>
+              <a:rPr lang="en-US" dirty="0"/>
+              <a:t>LIMITATIONS</a:t>
+            </a:r>
+          </a:p>
+        </p:txBody>
+      </p:sp>
+      <p:sp>
+        <p:nvSpPr>
+          <p:cNvPr id="8" name="Content Placeholder 7"/>
+          <p:cNvSpPr>
+            <a:spLocks noGrp="1"/>
+          </p:cNvSpPr>
+          <p:nvPr>
+            <p:ph sz="quarter" idx="1"/>
+          </p:nvPr>
+        </p:nvSpPr>
+        <p:spPr/>
+        <p:txBody>
+          <a:bodyPr/>
+          <a:lstStyle/>
+          <a:p>
+            <a:pPr marL="0" indent="0">
+              <a:buNone/>
+            </a:pPr>
+            <a:r>
+              <a:rPr lang="en-US" dirty="0"/>
+              <a:t>Being unable to access the orange-fleshed sweet potato dataset in Nigeria, we accessed the dataset from </a:t>
+            </a:r>
+            <a:r>
+              <a:rPr lang="en-US" dirty="0" err="1"/>
+              <a:t>Nkolbisson</a:t>
+            </a:r>
+            <a:r>
+              <a:rPr lang="en-US" dirty="0"/>
+              <a:t> in Cameroun and </a:t>
+            </a:r>
+            <a:r>
+              <a:rPr lang="en-US" dirty="0" err="1"/>
+              <a:t>Njombe</a:t>
+            </a:r>
+            <a:r>
+              <a:rPr lang="en-US" dirty="0"/>
+              <a:t> in Tanzania which contains data on both orange-fleshed and white-fleshed sweet potatoes.</a:t>
+            </a:r>
+          </a:p>
+        </p:txBody>
+      </p:sp>
+    </p:spTree>
+    <p:extLst>
+      <p:ext uri="{BB962C8B-B14F-4D97-AF65-F5344CB8AC3E}">
+        <p14:creationId xmlns:p14="http://schemas.microsoft.com/office/powerpoint/2010/main" val="2759707441"/>
+      </p:ext>
+    </p:extLst>
+  </p:cSld>
+  <p:clrMapOvr>
+    <a:masterClrMapping/>
+  </p:clrMapOvr>
+  <p:transition spd="slow">
+    <p:wipe/>
+  </p:transition>
+</p:sld>
+</file>
+
+<file path=ppt/slides/slide7.xml><?xml version="1.0" encoding="utf-8"?>
+<p:sld xmlns:a="http://schemas.openxmlformats.org/drawingml/2006/main" xmlns:r="http://schemas.openxmlformats.org/officeDocument/2006/relationships" xmlns:p="http://schemas.openxmlformats.org/presentationml/2006/main">
+  <p:cSld>
+    <p:spTree>
+      <p:nvGrpSpPr>
+        <p:cNvPr id="1" name=""/>
+        <p:cNvGrpSpPr/>
+        <p:nvPr/>
+      </p:nvGrpSpPr>
+      <p:grpSpPr>
+        <a:xfrm>
+          <a:off x="0" y="0"/>
+          <a:ext cx="0" cy="0"/>
+          <a:chOff x="0" y="0"/>
+          <a:chExt cx="0" cy="0"/>
+        </a:xfrm>
+      </p:grpSpPr>
+      <p:sp>
+        <p:nvSpPr>
+          <p:cNvPr id="2" name="Title 1"/>
+          <p:cNvSpPr>
+            <a:spLocks noGrp="1"/>
+          </p:cNvSpPr>
+          <p:nvPr>
+            <p:ph type="title"/>
+          </p:nvPr>
+        </p:nvSpPr>
+        <p:spPr>
+          <a:xfrm>
+            <a:off x="533400" y="228600"/>
+            <a:ext cx="7543800" cy="1143000"/>
+          </a:xfrm>
+        </p:spPr>
+        <p:txBody>
+          <a:bodyPr>
+            <a:normAutofit/>
+          </a:bodyPr>
+          <a:lstStyle/>
+          <a:p>
+            <a:r>
+              <a:rPr lang="en-US" sz="2200" dirty="0"/>
+              <a:t>GRAPHICAL REPRESENTATION SHOWING THE DISTINCTION BETWEEN WHITE-FLESHED AND ORANGE-FLESHED SWEET POTATOES</a:t>
+            </a:r>
+            <a:endParaRPr lang="en-US" dirty="0"/>
+          </a:p>
+        </p:txBody>
+      </p:sp>
+      <p:sp>
+        <p:nvSpPr>
+          <p:cNvPr id="5" name="Text Placeholder 4"/>
+          <p:cNvSpPr>
+            <a:spLocks noGrp="1"/>
+          </p:cNvSpPr>
+          <p:nvPr>
+            <p:ph type="body" sz="quarter" idx="1"/>
+          </p:nvPr>
+        </p:nvSpPr>
+        <p:spPr>
+          <a:xfrm>
+            <a:off x="457200" y="1447800"/>
+            <a:ext cx="3657600" cy="533400"/>
+          </a:xfrm>
+        </p:spPr>
+        <p:txBody>
+          <a:bodyPr/>
+          <a:lstStyle/>
+          <a:p>
+            <a:r>
+              <a:rPr lang="en-US" sz="1600" dirty="0"/>
+              <a:t>WHITE-FLESHED</a:t>
+            </a:r>
+            <a:endParaRPr lang="en-US" dirty="0"/>
+          </a:p>
+        </p:txBody>
+      </p:sp>
+      <p:sp>
+        <p:nvSpPr>
+          <p:cNvPr id="6" name="Text Placeholder 5"/>
+          <p:cNvSpPr>
+            <a:spLocks noGrp="1"/>
+          </p:cNvSpPr>
+          <p:nvPr>
+            <p:ph type="body" sz="quarter" idx="3"/>
+          </p:nvPr>
+        </p:nvSpPr>
+        <p:spPr>
+          <a:xfrm>
+            <a:off x="4419600" y="1447800"/>
+            <a:ext cx="3657600" cy="533400"/>
+          </a:xfrm>
+        </p:spPr>
+        <p:txBody>
+          <a:bodyPr/>
+          <a:lstStyle/>
+          <a:p>
+            <a:r>
+              <a:rPr lang="en-US" sz="1600" dirty="0"/>
+              <a:t>ORANGE-FLESHED</a:t>
+            </a:r>
+            <a:endParaRPr lang="en-US" dirty="0"/>
+          </a:p>
+        </p:txBody>
+      </p:sp>
+      <p:pic>
+        <p:nvPicPr>
+          <p:cNvPr id="8" name="Content Placeholder 7"/>
+          <p:cNvPicPr>
+            <a:picLocks noGrp="1" noChangeAspect="1"/>
+          </p:cNvPicPr>
+          <p:nvPr>
+            <p:ph sz="quarter" idx="2"/>
+          </p:nvPr>
+        </p:nvPicPr>
+        <p:blipFill>
+          <a:blip r:embed="rId2" cstate="print">
+            <a:extLst>
+              <a:ext uri="{28A0092B-C50C-407E-A947-70E740481C1C}">
+                <a14:useLocalDpi xmlns:a14="http://schemas.microsoft.com/office/drawing/2010/main" val="0"/>
+              </a:ext>
+            </a:extLst>
+          </a:blip>
+          <a:stretch>
+            <a:fillRect/>
+          </a:stretch>
+        </p:blipFill>
+        <p:spPr>
+          <a:xfrm>
+            <a:off x="228600" y="2286000"/>
+            <a:ext cx="4191000" cy="4114800"/>
+          </a:xfrm>
+        </p:spPr>
+      </p:pic>
+      <p:pic>
+        <p:nvPicPr>
+          <p:cNvPr id="10" name="Content Placeholder 9"/>
+          <p:cNvPicPr>
+            <a:picLocks noGrp="1" noChangeAspect="1"/>
+          </p:cNvPicPr>
+          <p:nvPr>
+            <p:ph sz="quarter" idx="4"/>
+          </p:nvPr>
+        </p:nvPicPr>
+        <p:blipFill>
+          <a:blip r:embed="rId3" cstate="print">
+            <a:extLst>
+              <a:ext uri="{28A0092B-C50C-407E-A947-70E740481C1C}">
+                <a14:useLocalDpi xmlns:a14="http://schemas.microsoft.com/office/drawing/2010/main" val="0"/>
+              </a:ext>
+            </a:extLst>
+          </a:blip>
+          <a:stretch>
+            <a:fillRect/>
+          </a:stretch>
+        </p:blipFill>
+        <p:spPr>
+          <a:xfrm>
+            <a:off x="4572000" y="2286000"/>
+            <a:ext cx="4162426" cy="4191000"/>
+          </a:xfrm>
+        </p:spPr>
+      </p:pic>
+    </p:spTree>
+    <p:extLst>
+      <p:ext uri="{BB962C8B-B14F-4D97-AF65-F5344CB8AC3E}">
+        <p14:creationId xmlns:p14="http://schemas.microsoft.com/office/powerpoint/2010/main" val="248086809"/>
+      </p:ext>
+    </p:extLst>
+  </p:cSld>
+  <p:clrMapOvr>
+    <a:masterClrMapping/>
+  </p:clrMapOvr>
+  <p:transition spd="slow">
+    <p:wheel spokes="1"/>
+  </p:transition>
+</p:sld>
+</file>
+
+<file path=ppt/slides/slide8.xml><?xml version="1.0" encoding="utf-8"?>
+<p:sld xmlns:a="http://schemas.openxmlformats.org/drawingml/2006/main" xmlns:r="http://schemas.openxmlformats.org/officeDocument/2006/relationships" xmlns:p="http://schemas.openxmlformats.org/presentationml/2006/main">
+  <p:cSld>
+    <p:spTree>
+      <p:nvGrpSpPr>
+        <p:cNvPr id="1" name=""/>
+        <p:cNvGrpSpPr/>
+        <p:nvPr/>
+      </p:nvGrpSpPr>
+      <p:grpSpPr>
+        <a:xfrm>
+          <a:off x="0" y="0"/>
+          <a:ext cx="0" cy="0"/>
+          <a:chOff x="0" y="0"/>
+          <a:chExt cx="0" cy="0"/>
+        </a:xfrm>
+      </p:grpSpPr>
+      <p:sp>
+        <p:nvSpPr>
+          <p:cNvPr id="7" name="Title 6"/>
+          <p:cNvSpPr>
+            <a:spLocks noGrp="1"/>
+          </p:cNvSpPr>
+          <p:nvPr>
+            <p:ph type="title"/>
+          </p:nvPr>
+        </p:nvSpPr>
+        <p:spPr/>
+        <p:txBody>
+          <a:bodyPr>
+            <a:normAutofit/>
+          </a:bodyPr>
+          <a:lstStyle/>
+          <a:p>
+            <a:r>
+              <a:rPr lang="en-US" b="1" u="sng" dirty="0">
                 <a:solidFill>
                   <a:schemeClr val="tx1"/>
                 </a:solidFill>
               </a:rPr>
               <a:t>WORKFLOW IN DETAILS</a:t>
             </a:r>
-            <a:r>
-              <a:rPr lang="en-US" dirty="0" smtClean="0"/>
-              <a:t/>
-            </a:r>
             <a:br>
-              <a:rPr lang="en-US" dirty="0" smtClean="0"/>
+              <a:rPr lang="en-US" dirty="0"/>
             </a:br>
             <a:r>
               <a:rPr lang="en-US" dirty="0"/>
-              <a:t>FEATURES USED FOR </a:t>
-            </a:r>
-            <a:r>
-              <a:rPr lang="en-US" dirty="0" smtClean="0"/>
-              <a:t>ANALYSIS</a:t>
-            </a:r>
-            <a:endParaRPr lang="en-US" dirty="0"/>
+              <a:t>FEATURES USED FOR ANALYSIS</a:t>
+            </a:r>
           </a:p>
         </p:txBody>
       </p:sp>
@@ -6150,68 +7457,58 @@
           <a:lstStyle/>
           <a:p>
             <a:r>
-              <a:rPr lang="en-US" dirty="0" smtClean="0"/>
+              <a:rPr lang="en-US" dirty="0"/>
               <a:t>Location</a:t>
             </a:r>
           </a:p>
           <a:p>
             <a:r>
-              <a:rPr lang="en-US" dirty="0" smtClean="0"/>
+              <a:rPr lang="en-US" dirty="0"/>
               <a:t>Type of soil</a:t>
             </a:r>
           </a:p>
           <a:p>
             <a:r>
-              <a:rPr lang="en-US" dirty="0" err="1" smtClean="0"/>
-              <a:t>Colour</a:t>
-            </a:r>
-            <a:r>
-              <a:rPr lang="en-US" dirty="0" smtClean="0"/>
-              <a:t> of the potato’s flesh</a:t>
-            </a:r>
-          </a:p>
-          <a:p>
-            <a:r>
-              <a:rPr lang="en-US" dirty="0" smtClean="0"/>
+              <a:rPr lang="en-US" dirty="0"/>
               <a:t>Fertilizer</a:t>
             </a:r>
           </a:p>
           <a:p>
             <a:r>
-              <a:rPr lang="en-US" dirty="0" smtClean="0"/>
+              <a:rPr lang="en-US" dirty="0"/>
               <a:t>Repetitions</a:t>
             </a:r>
           </a:p>
           <a:p>
             <a:r>
-              <a:rPr lang="en-US" dirty="0" smtClean="0"/>
+              <a:rPr lang="en-US" dirty="0"/>
               <a:t>Branches</a:t>
             </a:r>
           </a:p>
           <a:p>
             <a:r>
-              <a:rPr lang="en-US" dirty="0" smtClean="0"/>
+              <a:rPr lang="en-US" dirty="0"/>
               <a:t>Length of stem</a:t>
             </a:r>
           </a:p>
           <a:p>
             <a:r>
-              <a:rPr lang="en-US" dirty="0" smtClean="0"/>
+              <a:rPr lang="en-US" dirty="0"/>
               <a:t>Index of leaf area</a:t>
             </a:r>
           </a:p>
           <a:p>
             <a:r>
-              <a:rPr lang="en-US" dirty="0" err="1" smtClean="0"/>
+              <a:rPr lang="en-US" dirty="0" err="1"/>
               <a:t>Petoile</a:t>
             </a:r>
             <a:r>
-              <a:rPr lang="en-US" dirty="0" smtClean="0"/>
+              <a:rPr lang="en-US" dirty="0"/>
               <a:t> length of leaf</a:t>
             </a:r>
           </a:p>
           <a:p>
-            <a:endParaRPr lang="en-US" dirty="0" smtClean="0"/>
+            <a:endParaRPr lang="en-US" dirty="0"/>
           </a:p>
           <a:p>
             <a:endParaRPr lang="en-US" dirty="0"/>
@@ -6236,34 +7533,33 @@
           <a:lstStyle/>
           <a:p>
             <a:r>
-              <a:rPr lang="en-US" dirty="0" smtClean="0"/>
+              <a:rPr lang="en-US" dirty="0"/>
               <a:t>Weight of adventitious root</a:t>
             </a:r>
           </a:p>
           <a:p>
             <a:r>
-              <a:rPr lang="en-US" dirty="0" smtClean="0"/>
+              <a:rPr lang="en-US" dirty="0"/>
               <a:t>Weight of the dry biomass</a:t>
             </a:r>
           </a:p>
           <a:p>
             <a:r>
-              <a:rPr lang="en-US" dirty="0" smtClean="0"/>
+              <a:rPr lang="en-US" dirty="0"/>
               <a:t>Total storage weight of the roots</a:t>
             </a:r>
           </a:p>
           <a:p>
             <a:r>
-              <a:rPr lang="en-US" dirty="0" smtClean="0"/>
+              <a:rPr lang="en-US" dirty="0"/>
               <a:t>Total weight of marketable roots</a:t>
             </a:r>
           </a:p>
           <a:p>
             <a:r>
-              <a:rPr lang="en-US" dirty="0" smtClean="0"/>
+              <a:rPr lang="en-US" dirty="0"/>
               <a:t>Total number of roots stored.</a:t>
             </a:r>
-            <a:endParaRPr lang="en-US" dirty="0"/>
           </a:p>
         </p:txBody>
       </p:sp>
@@ -6289,17 +7585,10 @@
       </p:transition>
     </mc:Fallback>
   </mc:AlternateContent>
-  <p:timing>
-    <p:tnLst>
-      <p:par>
-        <p:cTn id="1" dur="indefinite" restart="never" nodeType="tmRoot"/>
-      </p:par>
-    </p:tnLst>
-  </p:timing>
 </p:sld>
 </file>
 
-<file path=ppt/slides/slide6.xml><?xml version="1.0" encoding="utf-8"?>
+<file path=ppt/slides/slide9.xml><?xml version="1.0" encoding="utf-8"?>
 <p:sld xmlns:a="http://schemas.openxmlformats.org/drawingml/2006/main" xmlns:r="http://schemas.openxmlformats.org/officeDocument/2006/relationships" xmlns:p="http://schemas.openxmlformats.org/presentationml/2006/main">
   <p:cSld>
     <p:spTree>
@@ -6340,7 +7629,7 @@
               <a:buNone/>
             </a:pPr>
             <a:r>
-              <a:rPr lang="en-US" sz="4000" b="1" u="sng" dirty="0" smtClean="0"/>
+              <a:rPr lang="en-US" sz="4000" b="1" u="sng" dirty="0"/>
               <a:t>TARGET USED FOR ANALYSIS</a:t>
             </a:r>
           </a:p>
@@ -6348,14 +7637,14 @@
             <a:pPr marL="0" indent="0">
               <a:buNone/>
             </a:pPr>
-            <a:endParaRPr lang="en-US" sz="1200" b="1" u="sng" dirty="0" smtClean="0"/>
+            <a:endParaRPr lang="en-US" sz="1200" b="1" u="sng" dirty="0"/>
           </a:p>
           <a:p>
             <a:pPr marL="0" indent="0">
               <a:buNone/>
             </a:pPr>
             <a:r>
-              <a:rPr lang="en-US" sz="2800" dirty="0" smtClean="0"/>
+              <a:rPr lang="en-US" sz="2800" dirty="0"/>
               <a:t>Marketable Yield</a:t>
             </a:r>
             <a:endParaRPr lang="en-US" dirty="0"/>
@@ -6384,913 +7673,6 @@
       </p:transition>
     </mc:Fallback>
   </mc:AlternateContent>
-  <p:timing>
-    <p:tnLst>
-      <p:par>
-        <p:cTn id="1" dur="indefinite" restart="never" nodeType="tmRoot"/>
-      </p:par>
-    </p:tnLst>
-  </p:timing>
-</p:sld>
-</file>
-
-<file path=ppt/slides/slide7.xml><?xml version="1.0" encoding="utf-8"?>
-<p:sld xmlns:a="http://schemas.openxmlformats.org/drawingml/2006/main" xmlns:r="http://schemas.openxmlformats.org/officeDocument/2006/relationships" xmlns:p="http://schemas.openxmlformats.org/presentationml/2006/main">
-  <p:cSld>
-    <p:spTree>
-      <p:nvGrpSpPr>
-        <p:cNvPr id="1" name=""/>
-        <p:cNvGrpSpPr/>
-        <p:nvPr/>
-      </p:nvGrpSpPr>
-      <p:grpSpPr>
-        <a:xfrm>
-          <a:off x="0" y="0"/>
-          <a:ext cx="0" cy="0"/>
-          <a:chOff x="0" y="0"/>
-          <a:chExt cx="0" cy="0"/>
-        </a:xfrm>
-      </p:grpSpPr>
-      <p:sp>
-        <p:nvSpPr>
-          <p:cNvPr id="2" name="Title 1"/>
-          <p:cNvSpPr>
-            <a:spLocks noGrp="1"/>
-          </p:cNvSpPr>
-          <p:nvPr>
-            <p:ph type="title"/>
-          </p:nvPr>
-        </p:nvSpPr>
-        <p:spPr>
-          <a:xfrm>
-            <a:off x="457200" y="152400"/>
-            <a:ext cx="7467600" cy="1143000"/>
-          </a:xfrm>
-        </p:spPr>
-        <p:txBody>
-          <a:bodyPr/>
-          <a:lstStyle/>
-          <a:p>
-            <a:r>
-              <a:rPr lang="en-US" dirty="0" smtClean="0"/>
-              <a:t>DATA PRE-PROCESSING AND SPLITTING</a:t>
-            </a:r>
-            <a:endParaRPr lang="en-US" dirty="0"/>
-          </a:p>
-        </p:txBody>
-      </p:sp>
-      <p:pic>
-        <p:nvPicPr>
-          <p:cNvPr id="6" name="Content Placeholder 5"/>
-          <p:cNvPicPr>
-            <a:picLocks noGrp="1" noChangeAspect="1"/>
-          </p:cNvPicPr>
-          <p:nvPr>
-            <p:ph sz="quarter" idx="1"/>
-          </p:nvPr>
-        </p:nvPicPr>
-        <p:blipFill>
-          <a:blip r:embed="rId2">
-            <a:extLst>
-              <a:ext uri="{28A0092B-C50C-407E-A947-70E740481C1C}">
-                <a14:useLocalDpi xmlns:a14="http://schemas.microsoft.com/office/drawing/2010/main" val="0"/>
-              </a:ext>
-            </a:extLst>
-          </a:blip>
-          <a:stretch>
-            <a:fillRect/>
-          </a:stretch>
-        </p:blipFill>
-        <p:spPr>
-          <a:xfrm>
-            <a:off x="457200" y="4800600"/>
-            <a:ext cx="7467600" cy="1768934"/>
-          </a:xfrm>
-        </p:spPr>
-      </p:pic>
-      <p:pic>
-        <p:nvPicPr>
-          <p:cNvPr id="7" name="Picture 6"/>
-          <p:cNvPicPr>
-            <a:picLocks noChangeAspect="1"/>
-          </p:cNvPicPr>
-          <p:nvPr/>
-        </p:nvPicPr>
-        <p:blipFill>
-          <a:blip r:embed="rId3">
-            <a:extLst>
-              <a:ext uri="{28A0092B-C50C-407E-A947-70E740481C1C}">
-                <a14:useLocalDpi xmlns:a14="http://schemas.microsoft.com/office/drawing/2010/main" val="0"/>
-              </a:ext>
-            </a:extLst>
-          </a:blip>
-          <a:stretch>
-            <a:fillRect/>
-          </a:stretch>
-        </p:blipFill>
-        <p:spPr>
-          <a:xfrm>
-            <a:off x="0" y="1524000"/>
-            <a:ext cx="8686800" cy="2743200"/>
-          </a:xfrm>
-          <a:prstGeom prst="rect">
-            <a:avLst/>
-          </a:prstGeom>
-        </p:spPr>
-      </p:pic>
-    </p:spTree>
-    <p:extLst>
-      <p:ext uri="{BB962C8B-B14F-4D97-AF65-F5344CB8AC3E}">
-        <p14:creationId xmlns:p14="http://schemas.microsoft.com/office/powerpoint/2010/main" val="372625396"/>
-      </p:ext>
-    </p:extLst>
-  </p:cSld>
-  <p:clrMapOvr>
-    <a:masterClrMapping/>
-  </p:clrMapOvr>
-  <p:transition spd="slow">
-    <p:wipe/>
-  </p:transition>
-  <p:timing>
-    <p:tnLst>
-      <p:par>
-        <p:cTn id="1" dur="indefinite" restart="never" nodeType="tmRoot"/>
-      </p:par>
-    </p:tnLst>
-  </p:timing>
-</p:sld>
-</file>
-
-<file path=ppt/slides/slide8.xml><?xml version="1.0" encoding="utf-8"?>
-<p:sld xmlns:a="http://schemas.openxmlformats.org/drawingml/2006/main" xmlns:r="http://schemas.openxmlformats.org/officeDocument/2006/relationships" xmlns:p="http://schemas.openxmlformats.org/presentationml/2006/main">
-  <p:cSld>
-    <p:spTree>
-      <p:nvGrpSpPr>
-        <p:cNvPr id="1" name=""/>
-        <p:cNvGrpSpPr/>
-        <p:nvPr/>
-      </p:nvGrpSpPr>
-      <p:grpSpPr>
-        <a:xfrm>
-          <a:off x="0" y="0"/>
-          <a:ext cx="0" cy="0"/>
-          <a:chOff x="0" y="0"/>
-          <a:chExt cx="0" cy="0"/>
-        </a:xfrm>
-      </p:grpSpPr>
-      <p:sp>
-        <p:nvSpPr>
-          <p:cNvPr id="5" name="Title 4"/>
-          <p:cNvSpPr>
-            <a:spLocks noGrp="1"/>
-          </p:cNvSpPr>
-          <p:nvPr>
-            <p:ph type="title"/>
-          </p:nvPr>
-        </p:nvSpPr>
-        <p:spPr>
-          <a:xfrm>
-            <a:off x="304800" y="228600"/>
-            <a:ext cx="7467600" cy="655638"/>
-          </a:xfrm>
-        </p:spPr>
-        <p:txBody>
-          <a:bodyPr>
-            <a:normAutofit fontScale="90000"/>
-          </a:bodyPr>
-          <a:lstStyle/>
-          <a:p>
-            <a:r>
-              <a:rPr lang="en-US" sz="4000" dirty="0" smtClean="0"/>
-              <a:t>MODEL EVALUATION</a:t>
-            </a:r>
-            <a:endParaRPr lang="en-US" sz="4000" dirty="0"/>
-          </a:p>
-        </p:txBody>
-      </p:sp>
-      <p:graphicFrame>
-        <p:nvGraphicFramePr>
-          <p:cNvPr id="9" name="Content Placeholder 8"/>
-          <p:cNvGraphicFramePr>
-            <a:graphicFrameLocks noGrp="1"/>
-          </p:cNvGraphicFramePr>
-          <p:nvPr>
-            <p:ph sz="quarter" idx="1"/>
-            <p:extLst>
-              <p:ext uri="{D42A27DB-BD31-4B8C-83A1-F6EECF244321}">
-                <p14:modId xmlns:p14="http://schemas.microsoft.com/office/powerpoint/2010/main" val="3706474294"/>
-              </p:ext>
-            </p:extLst>
-          </p:nvPr>
-        </p:nvGraphicFramePr>
-        <p:xfrm>
-          <a:off x="304800" y="990600"/>
-          <a:ext cx="8458200" cy="5410202"/>
-        </p:xfrm>
-        <a:graphic>
-          <a:graphicData uri="http://schemas.openxmlformats.org/drawingml/2006/table">
-            <a:tbl>
-              <a:tblPr firstRow="1" bandRow="1">
-                <a:tableStyleId>{5C22544A-7EE6-4342-B048-85BDC9FD1C3A}</a:tableStyleId>
-              </a:tblPr>
-              <a:tblGrid>
-                <a:gridCol w="2667000"/>
-                <a:gridCol w="2819400"/>
-                <a:gridCol w="2971800"/>
-              </a:tblGrid>
-              <a:tr h="488189">
-                <a:tc>
-                  <a:txBody>
-                    <a:bodyPr/>
-                    <a:lstStyle/>
-                    <a:p>
-                      <a:pPr algn="ctr"/>
-                      <a:r>
-                        <a:rPr lang="en-US" dirty="0" smtClean="0"/>
-                        <a:t>MODEL</a:t>
-                      </a:r>
-                      <a:endParaRPr lang="en-US" dirty="0"/>
-                    </a:p>
-                  </a:txBody>
-                  <a:tcPr/>
-                </a:tc>
-                <a:tc>
-                  <a:txBody>
-                    <a:bodyPr/>
-                    <a:lstStyle/>
-                    <a:p>
-                      <a:pPr algn="ctr"/>
-                      <a:r>
-                        <a:rPr lang="en-US" dirty="0" smtClean="0"/>
-                        <a:t>Mean</a:t>
-                      </a:r>
-                      <a:r>
-                        <a:rPr lang="en-US" baseline="0" dirty="0" smtClean="0"/>
-                        <a:t> Absolute Error</a:t>
-                      </a:r>
-                      <a:endParaRPr lang="en-US" dirty="0"/>
-                    </a:p>
-                  </a:txBody>
-                  <a:tcPr/>
-                </a:tc>
-                <a:tc>
-                  <a:txBody>
-                    <a:bodyPr/>
-                    <a:lstStyle/>
-                    <a:p>
-                      <a:pPr algn="ctr"/>
-                      <a:r>
-                        <a:rPr lang="en-US" dirty="0" smtClean="0"/>
-                        <a:t>Mean</a:t>
-                      </a:r>
-                      <a:r>
-                        <a:rPr lang="en-US" baseline="0" dirty="0" smtClean="0"/>
-                        <a:t> Squared Error</a:t>
-                      </a:r>
-                      <a:endParaRPr lang="en-US" dirty="0"/>
-                    </a:p>
-                  </a:txBody>
-                  <a:tcPr/>
-                </a:tc>
-              </a:tr>
-              <a:tr h="514938">
-                <a:tc>
-                  <a:txBody>
-                    <a:bodyPr/>
-                    <a:lstStyle/>
-                    <a:p>
-                      <a:r>
-                        <a:rPr lang="en-US" dirty="0" smtClean="0"/>
-                        <a:t>Linear </a:t>
-                      </a:r>
-                      <a:r>
-                        <a:rPr lang="en-US" dirty="0" err="1" smtClean="0"/>
-                        <a:t>Regressor</a:t>
-                      </a:r>
-                      <a:r>
-                        <a:rPr lang="en-US" dirty="0" smtClean="0"/>
-                        <a:t> </a:t>
-                      </a:r>
-                      <a:endParaRPr lang="en-US" dirty="0"/>
-                    </a:p>
-                  </a:txBody>
-                  <a:tcPr/>
-                </a:tc>
-                <a:tc>
-                  <a:txBody>
-                    <a:bodyPr/>
-                    <a:lstStyle/>
-                    <a:p>
-                      <a:pPr algn="ctr"/>
-                      <a:r>
-                        <a:rPr lang="en-US" dirty="0" smtClean="0"/>
-                        <a:t>0.003</a:t>
-                      </a:r>
-                      <a:endParaRPr lang="en-US" dirty="0"/>
-                    </a:p>
-                  </a:txBody>
-                  <a:tcPr/>
-                </a:tc>
-                <a:tc>
-                  <a:txBody>
-                    <a:bodyPr/>
-                    <a:lstStyle/>
-                    <a:p>
-                      <a:pPr algn="ctr"/>
-                      <a:r>
-                        <a:rPr lang="en-US" dirty="0" smtClean="0"/>
-                        <a:t>1.111</a:t>
-                      </a:r>
-                      <a:endParaRPr lang="en-US" dirty="0"/>
-                    </a:p>
-                  </a:txBody>
-                  <a:tcPr/>
-                </a:tc>
-              </a:tr>
-              <a:tr h="501563">
-                <a:tc>
-                  <a:txBody>
-                    <a:bodyPr/>
-                    <a:lstStyle/>
-                    <a:p>
-                      <a:r>
-                        <a:rPr lang="en-US" dirty="0" smtClean="0"/>
-                        <a:t>Gamma</a:t>
-                      </a:r>
-                      <a:r>
-                        <a:rPr lang="en-US" baseline="0" dirty="0" smtClean="0"/>
-                        <a:t> </a:t>
-                      </a:r>
-                      <a:r>
-                        <a:rPr lang="en-US" dirty="0" err="1" smtClean="0"/>
-                        <a:t>Regressor</a:t>
-                      </a:r>
-                      <a:endParaRPr lang="en-US" dirty="0"/>
-                    </a:p>
-                  </a:txBody>
-                  <a:tcPr/>
-                </a:tc>
-                <a:tc>
-                  <a:txBody>
-                    <a:bodyPr/>
-                    <a:lstStyle/>
-                    <a:p>
-                      <a:pPr algn="ctr"/>
-                      <a:r>
-                        <a:rPr lang="en-US" dirty="0" smtClean="0"/>
-                        <a:t>1.382</a:t>
-                      </a:r>
-                      <a:endParaRPr lang="en-US" dirty="0"/>
-                    </a:p>
-                  </a:txBody>
-                  <a:tcPr/>
-                </a:tc>
-                <a:tc>
-                  <a:txBody>
-                    <a:bodyPr/>
-                    <a:lstStyle/>
-                    <a:p>
-                      <a:pPr algn="ctr"/>
-                      <a:r>
-                        <a:rPr lang="en-US" dirty="0" smtClean="0"/>
-                        <a:t>4.185</a:t>
-                      </a:r>
-                      <a:endParaRPr lang="en-US" dirty="0"/>
-                    </a:p>
-                  </a:txBody>
-                  <a:tcPr/>
-                </a:tc>
-              </a:tr>
-              <a:tr h="488189">
-                <a:tc>
-                  <a:txBody>
-                    <a:bodyPr/>
-                    <a:lstStyle/>
-                    <a:p>
-                      <a:r>
-                        <a:rPr lang="en-US" dirty="0" smtClean="0"/>
-                        <a:t>Huber </a:t>
-                      </a:r>
-                      <a:r>
-                        <a:rPr lang="en-US" dirty="0" err="1" smtClean="0"/>
-                        <a:t>Regressor</a:t>
-                      </a:r>
-                      <a:endParaRPr lang="en-US" dirty="0"/>
-                    </a:p>
-                  </a:txBody>
-                  <a:tcPr/>
-                </a:tc>
-                <a:tc>
-                  <a:txBody>
-                    <a:bodyPr/>
-                    <a:lstStyle/>
-                    <a:p>
-                      <a:pPr algn="ctr"/>
-                      <a:r>
-                        <a:rPr lang="en-US" dirty="0" smtClean="0"/>
-                        <a:t>0.053</a:t>
-                      </a:r>
-                      <a:endParaRPr lang="en-US" dirty="0"/>
-                    </a:p>
-                  </a:txBody>
-                  <a:tcPr/>
-                </a:tc>
-                <a:tc>
-                  <a:txBody>
-                    <a:bodyPr/>
-                    <a:lstStyle/>
-                    <a:p>
-                      <a:pPr algn="ctr"/>
-                      <a:r>
-                        <a:rPr lang="en-US" dirty="0" smtClean="0"/>
-                        <a:t>0.004</a:t>
-                      </a:r>
-                      <a:endParaRPr lang="en-US" dirty="0"/>
-                    </a:p>
-                  </a:txBody>
-                  <a:tcPr/>
-                </a:tc>
-              </a:tr>
-              <a:tr h="488189">
-                <a:tc>
-                  <a:txBody>
-                    <a:bodyPr/>
-                    <a:lstStyle/>
-                    <a:p>
-                      <a:r>
-                        <a:rPr lang="en-US" dirty="0" smtClean="0"/>
-                        <a:t>Passive Aggressive</a:t>
-                      </a:r>
-                      <a:endParaRPr lang="en-US" dirty="0"/>
-                    </a:p>
-                  </a:txBody>
-                  <a:tcPr/>
-                </a:tc>
-                <a:tc>
-                  <a:txBody>
-                    <a:bodyPr/>
-                    <a:lstStyle/>
-                    <a:p>
-                      <a:pPr algn="ctr"/>
-                      <a:r>
-                        <a:rPr lang="en-US" dirty="0" smtClean="0"/>
-                        <a:t>0.750</a:t>
-                      </a:r>
-                      <a:endParaRPr lang="en-US" dirty="0"/>
-                    </a:p>
-                  </a:txBody>
-                  <a:tcPr/>
-                </a:tc>
-                <a:tc>
-                  <a:txBody>
-                    <a:bodyPr/>
-                    <a:lstStyle/>
-                    <a:p>
-                      <a:pPr algn="ctr"/>
-                      <a:r>
-                        <a:rPr lang="en-US" dirty="0" smtClean="0"/>
-                        <a:t>0.820</a:t>
-                      </a:r>
-                      <a:endParaRPr lang="en-US" dirty="0"/>
-                    </a:p>
-                  </a:txBody>
-                  <a:tcPr/>
-                </a:tc>
-              </a:tr>
-              <a:tr h="488189">
-                <a:tc>
-                  <a:txBody>
-                    <a:bodyPr/>
-                    <a:lstStyle/>
-                    <a:p>
-                      <a:r>
-                        <a:rPr lang="en-US" dirty="0" smtClean="0"/>
-                        <a:t>Poisson </a:t>
-                      </a:r>
-                      <a:r>
-                        <a:rPr lang="en-US" dirty="0" err="1" smtClean="0"/>
-                        <a:t>Regressor</a:t>
-                      </a:r>
-                      <a:endParaRPr lang="en-US" dirty="0"/>
-                    </a:p>
-                  </a:txBody>
-                  <a:tcPr/>
-                </a:tc>
-                <a:tc>
-                  <a:txBody>
-                    <a:bodyPr/>
-                    <a:lstStyle/>
-                    <a:p>
-                      <a:pPr algn="ctr"/>
-                      <a:r>
-                        <a:rPr lang="en-US" dirty="0" smtClean="0"/>
-                        <a:t>1.236</a:t>
-                      </a:r>
-                      <a:endParaRPr lang="en-US" dirty="0"/>
-                    </a:p>
-                  </a:txBody>
-                  <a:tcPr/>
-                </a:tc>
-                <a:tc>
-                  <a:txBody>
-                    <a:bodyPr/>
-                    <a:lstStyle/>
-                    <a:p>
-                      <a:pPr algn="ctr"/>
-                      <a:r>
-                        <a:rPr lang="en-US" dirty="0" smtClean="0"/>
-                        <a:t>0.820</a:t>
-                      </a:r>
-                      <a:endParaRPr lang="en-US" dirty="0"/>
-                    </a:p>
-                  </a:txBody>
-                  <a:tcPr/>
-                </a:tc>
-              </a:tr>
-              <a:tr h="488189">
-                <a:tc>
-                  <a:txBody>
-                    <a:bodyPr/>
-                    <a:lstStyle/>
-                    <a:p>
-                      <a:r>
-                        <a:rPr lang="en-US" dirty="0" err="1" smtClean="0"/>
-                        <a:t>Quantile</a:t>
-                      </a:r>
-                      <a:r>
-                        <a:rPr lang="en-US" dirty="0" smtClean="0"/>
-                        <a:t> </a:t>
-                      </a:r>
-                      <a:r>
-                        <a:rPr lang="en-US" dirty="0" err="1" smtClean="0"/>
-                        <a:t>Regressor</a:t>
-                      </a:r>
-                      <a:endParaRPr lang="en-US" dirty="0"/>
-                    </a:p>
-                  </a:txBody>
-                  <a:tcPr/>
-                </a:tc>
-                <a:tc>
-                  <a:txBody>
-                    <a:bodyPr/>
-                    <a:lstStyle/>
-                    <a:p>
-                      <a:pPr algn="ctr"/>
-                      <a:r>
-                        <a:rPr lang="en-US" dirty="0" smtClean="0"/>
-                        <a:t>4.088</a:t>
-                      </a:r>
-                      <a:endParaRPr lang="en-US" dirty="0"/>
-                    </a:p>
-                  </a:txBody>
-                  <a:tcPr/>
-                </a:tc>
-                <a:tc>
-                  <a:txBody>
-                    <a:bodyPr/>
-                    <a:lstStyle/>
-                    <a:p>
-                      <a:pPr algn="ctr"/>
-                      <a:r>
-                        <a:rPr lang="en-US" dirty="0" smtClean="0"/>
-                        <a:t>2.576</a:t>
-                      </a:r>
-                      <a:endParaRPr lang="en-US" dirty="0"/>
-                    </a:p>
-                  </a:txBody>
-                  <a:tcPr/>
-                </a:tc>
-              </a:tr>
-              <a:tr h="488189">
-                <a:tc>
-                  <a:txBody>
-                    <a:bodyPr/>
-                    <a:lstStyle/>
-                    <a:p>
-                      <a:r>
-                        <a:rPr lang="en-US" dirty="0" smtClean="0"/>
-                        <a:t>RANSAC </a:t>
-                      </a:r>
-                      <a:r>
-                        <a:rPr lang="en-US" dirty="0" err="1" smtClean="0"/>
-                        <a:t>Regressor</a:t>
-                      </a:r>
-                      <a:endParaRPr lang="en-US" dirty="0"/>
-                    </a:p>
-                  </a:txBody>
-                  <a:tcPr/>
-                </a:tc>
-                <a:tc>
-                  <a:txBody>
-                    <a:bodyPr/>
-                    <a:lstStyle/>
-                    <a:p>
-                      <a:pPr algn="ctr"/>
-                      <a:r>
-                        <a:rPr lang="en-US" dirty="0" smtClean="0"/>
-                        <a:t>0.003</a:t>
-                      </a:r>
-                      <a:endParaRPr lang="en-US" dirty="0"/>
-                    </a:p>
-                  </a:txBody>
-                  <a:tcPr/>
-                </a:tc>
-                <a:tc>
-                  <a:txBody>
-                    <a:bodyPr/>
-                    <a:lstStyle/>
-                    <a:p>
-                      <a:pPr algn="ctr"/>
-                      <a:r>
-                        <a:rPr lang="en-US" dirty="0" smtClean="0"/>
-                        <a:t>34.47</a:t>
-                      </a:r>
-                      <a:endParaRPr lang="en-US" dirty="0"/>
-                    </a:p>
-                  </a:txBody>
-                  <a:tcPr/>
-                </a:tc>
-              </a:tr>
-              <a:tr h="488189">
-                <a:tc>
-                  <a:txBody>
-                    <a:bodyPr/>
-                    <a:lstStyle/>
-                    <a:p>
-                      <a:r>
-                        <a:rPr lang="en-US" dirty="0" err="1" smtClean="0"/>
-                        <a:t>TheilSen</a:t>
-                      </a:r>
-                      <a:r>
-                        <a:rPr lang="en-US" dirty="0" smtClean="0"/>
-                        <a:t> </a:t>
-                      </a:r>
-                      <a:r>
-                        <a:rPr lang="en-US" dirty="0" err="1" smtClean="0"/>
-                        <a:t>Regressor</a:t>
-                      </a:r>
-                      <a:endParaRPr lang="en-US" dirty="0"/>
-                    </a:p>
-                  </a:txBody>
-                  <a:tcPr/>
-                </a:tc>
-                <a:tc>
-                  <a:txBody>
-                    <a:bodyPr/>
-                    <a:lstStyle/>
-                    <a:p>
-                      <a:pPr algn="ctr"/>
-                      <a:r>
-                        <a:rPr lang="en-US" dirty="0" smtClean="0"/>
-                        <a:t>0.003</a:t>
-                      </a:r>
-                      <a:endParaRPr lang="en-US" dirty="0"/>
-                    </a:p>
-                  </a:txBody>
-                  <a:tcPr/>
-                </a:tc>
-                <a:tc>
-                  <a:txBody>
-                    <a:bodyPr/>
-                    <a:lstStyle/>
-                    <a:p>
-                      <a:pPr algn="ctr"/>
-                      <a:r>
-                        <a:rPr lang="en-US" dirty="0" smtClean="0"/>
-                        <a:t>1.092</a:t>
-                      </a:r>
-                      <a:endParaRPr lang="en-US" dirty="0"/>
-                    </a:p>
-                  </a:txBody>
-                  <a:tcPr/>
-                </a:tc>
-              </a:tr>
-              <a:tr h="488189">
-                <a:tc>
-                  <a:txBody>
-                    <a:bodyPr/>
-                    <a:lstStyle/>
-                    <a:p>
-                      <a:r>
-                        <a:rPr lang="en-US" dirty="0" err="1" smtClean="0"/>
-                        <a:t>Tweedie</a:t>
-                      </a:r>
-                      <a:r>
-                        <a:rPr lang="en-US" baseline="0" dirty="0" smtClean="0"/>
-                        <a:t> </a:t>
-                      </a:r>
-                      <a:r>
-                        <a:rPr lang="en-US" baseline="0" dirty="0" err="1" smtClean="0"/>
-                        <a:t>Regressor</a:t>
-                      </a:r>
-                      <a:endParaRPr lang="en-US" dirty="0"/>
-                    </a:p>
-                  </a:txBody>
-                  <a:tcPr/>
-                </a:tc>
-                <a:tc>
-                  <a:txBody>
-                    <a:bodyPr/>
-                    <a:lstStyle/>
-                    <a:p>
-                      <a:pPr algn="ctr"/>
-                      <a:r>
-                        <a:rPr lang="en-US" dirty="0" smtClean="0"/>
-                        <a:t>0.576</a:t>
-                      </a:r>
-                      <a:endParaRPr lang="en-US" dirty="0"/>
-                    </a:p>
-                  </a:txBody>
-                  <a:tcPr/>
-                </a:tc>
-                <a:tc>
-                  <a:txBody>
-                    <a:bodyPr/>
-                    <a:lstStyle/>
-                    <a:p>
-                      <a:pPr algn="ctr"/>
-                      <a:r>
-                        <a:rPr lang="en-US" dirty="0" smtClean="0"/>
-                        <a:t>0.446</a:t>
-                      </a:r>
-                      <a:endParaRPr lang="en-US" dirty="0"/>
-                    </a:p>
-                  </a:txBody>
-                  <a:tcPr/>
-                </a:tc>
-              </a:tr>
-              <a:tr h="488189">
-                <a:tc>
-                  <a:txBody>
-                    <a:bodyPr/>
-                    <a:lstStyle/>
-                    <a:p>
-                      <a:r>
-                        <a:rPr lang="en-US" dirty="0" err="1" smtClean="0"/>
-                        <a:t>AdaBoost</a:t>
-                      </a:r>
-                      <a:r>
-                        <a:rPr lang="en-US" dirty="0" smtClean="0"/>
-                        <a:t> </a:t>
-                      </a:r>
-                      <a:r>
-                        <a:rPr lang="en-US" dirty="0" err="1" smtClean="0"/>
-                        <a:t>Regressor</a:t>
-                      </a:r>
-                      <a:endParaRPr lang="en-US" dirty="0"/>
-                    </a:p>
-                  </a:txBody>
-                  <a:tcPr/>
-                </a:tc>
-                <a:tc>
-                  <a:txBody>
-                    <a:bodyPr/>
-                    <a:lstStyle/>
-                    <a:p>
-                      <a:pPr algn="ctr"/>
-                      <a:r>
-                        <a:rPr lang="en-US" dirty="0" smtClean="0"/>
-                        <a:t>0.511</a:t>
-                      </a:r>
-                      <a:endParaRPr lang="en-US" dirty="0"/>
-                    </a:p>
-                  </a:txBody>
-                  <a:tcPr/>
-                </a:tc>
-                <a:tc>
-                  <a:txBody>
-                    <a:bodyPr/>
-                    <a:lstStyle/>
-                    <a:p>
-                      <a:pPr algn="ctr"/>
-                      <a:r>
-                        <a:rPr lang="en-US" dirty="0" smtClean="0"/>
-                        <a:t>0.443</a:t>
-                      </a:r>
-                      <a:endParaRPr lang="en-US" dirty="0"/>
-                    </a:p>
-                  </a:txBody>
-                  <a:tcPr/>
-                </a:tc>
-              </a:tr>
-            </a:tbl>
-          </a:graphicData>
-        </a:graphic>
-      </p:graphicFrame>
-    </p:spTree>
-    <p:extLst>
-      <p:ext uri="{BB962C8B-B14F-4D97-AF65-F5344CB8AC3E}">
-        <p14:creationId xmlns:p14="http://schemas.microsoft.com/office/powerpoint/2010/main" val="1292302375"/>
-      </p:ext>
-    </p:extLst>
-  </p:cSld>
-  <p:clrMapOvr>
-    <a:masterClrMapping/>
-  </p:clrMapOvr>
-  <p:transition spd="slow">
-    <p:push dir="u"/>
-  </p:transition>
-  <p:timing>
-    <p:tnLst>
-      <p:par>
-        <p:cTn id="1" dur="indefinite" restart="never" nodeType="tmRoot"/>
-      </p:par>
-    </p:tnLst>
-  </p:timing>
-</p:sld>
-</file>
-
-<file path=ppt/slides/slide9.xml><?xml version="1.0" encoding="utf-8"?>
-<p:sld xmlns:a="http://schemas.openxmlformats.org/drawingml/2006/main" xmlns:r="http://schemas.openxmlformats.org/officeDocument/2006/relationships" xmlns:p="http://schemas.openxmlformats.org/presentationml/2006/main">
-  <p:cSld>
-    <p:spTree>
-      <p:nvGrpSpPr>
-        <p:cNvPr id="1" name=""/>
-        <p:cNvGrpSpPr/>
-        <p:nvPr/>
-      </p:nvGrpSpPr>
-      <p:grpSpPr>
-        <a:xfrm>
-          <a:off x="0" y="0"/>
-          <a:ext cx="0" cy="0"/>
-          <a:chOff x="0" y="0"/>
-          <a:chExt cx="0" cy="0"/>
-        </a:xfrm>
-      </p:grpSpPr>
-      <p:sp>
-        <p:nvSpPr>
-          <p:cNvPr id="2" name="Title 1"/>
-          <p:cNvSpPr>
-            <a:spLocks noGrp="1"/>
-          </p:cNvSpPr>
-          <p:nvPr>
-            <p:ph type="title"/>
-          </p:nvPr>
-        </p:nvSpPr>
-        <p:spPr/>
-        <p:txBody>
-          <a:bodyPr>
-            <a:normAutofit/>
-          </a:bodyPr>
-          <a:lstStyle/>
-          <a:p>
-            <a:r>
-              <a:rPr lang="en-US" sz="4000" dirty="0" smtClean="0"/>
-              <a:t>MODEL DEPLOYMENT</a:t>
-            </a:r>
-            <a:endParaRPr lang="en-US" sz="4000" dirty="0"/>
-          </a:p>
-        </p:txBody>
-      </p:sp>
-      <p:pic>
-        <p:nvPicPr>
-          <p:cNvPr id="4" name="Content Placeholder 3"/>
-          <p:cNvPicPr>
-            <a:picLocks noGrp="1" noChangeAspect="1"/>
-          </p:cNvPicPr>
-          <p:nvPr>
-            <p:ph sz="quarter" idx="1"/>
-          </p:nvPr>
-        </p:nvPicPr>
-        <p:blipFill>
-          <a:blip r:embed="rId2">
-            <a:extLst>
-              <a:ext uri="{28A0092B-C50C-407E-A947-70E740481C1C}">
-                <a14:useLocalDpi xmlns:a14="http://schemas.microsoft.com/office/drawing/2010/main" val="0"/>
-              </a:ext>
-            </a:extLst>
-          </a:blip>
-          <a:stretch>
-            <a:fillRect/>
-          </a:stretch>
-        </p:blipFill>
-        <p:spPr>
-          <a:xfrm>
-            <a:off x="381000" y="1600200"/>
-            <a:ext cx="8382000" cy="4876800"/>
-          </a:xfrm>
-        </p:spPr>
-      </p:pic>
-    </p:spTree>
-    <p:extLst>
-      <p:ext uri="{BB962C8B-B14F-4D97-AF65-F5344CB8AC3E}">
-        <p14:creationId xmlns:p14="http://schemas.microsoft.com/office/powerpoint/2010/main" val="3219525236"/>
-      </p:ext>
-    </p:extLst>
-  </p:cSld>
-  <p:clrMapOvr>
-    <a:masterClrMapping/>
-  </p:clrMapOvr>
-  <p:transition spd="slow">
-    <p:pull/>
-  </p:transition>
-  <p:timing>
-    <p:tnLst>
-      <p:par>
-        <p:cTn id="1" dur="indefinite" restart="never" nodeType="tmRoot"/>
-      </p:par>
-    </p:tnLst>
-  </p:timing>
 </p:sld>
 </file>
 

</xml_diff>